<commit_message>
Further progress on the presentation - skeleton and most of information present. Everyone needs to detail their steps. Results TBD
</commit_message>
<xml_diff>
--- a/PEM_Presentation.pptx
+++ b/PEM_Presentation.pptx
@@ -13,27 +13,27 @@
     <p:sldId id="258" r:id="rId4"/>
     <p:sldId id="280" r:id="rId5"/>
     <p:sldId id="281" r:id="rId6"/>
-    <p:sldId id="259" r:id="rId7"/>
-    <p:sldId id="260" r:id="rId8"/>
-    <p:sldId id="261" r:id="rId9"/>
-    <p:sldId id="262" r:id="rId10"/>
-    <p:sldId id="263" r:id="rId11"/>
-    <p:sldId id="264" r:id="rId12"/>
-    <p:sldId id="265" r:id="rId13"/>
-    <p:sldId id="266" r:id="rId14"/>
-    <p:sldId id="267" r:id="rId15"/>
-    <p:sldId id="268" r:id="rId16"/>
-    <p:sldId id="269" r:id="rId17"/>
-    <p:sldId id="270" r:id="rId18"/>
-    <p:sldId id="271" r:id="rId19"/>
-    <p:sldId id="272" r:id="rId20"/>
-    <p:sldId id="273" r:id="rId21"/>
-    <p:sldId id="274" r:id="rId22"/>
+    <p:sldId id="282" r:id="rId7"/>
+    <p:sldId id="283" r:id="rId8"/>
+    <p:sldId id="266" r:id="rId9"/>
+    <p:sldId id="268" r:id="rId10"/>
+    <p:sldId id="267" r:id="rId11"/>
+    <p:sldId id="269" r:id="rId12"/>
+    <p:sldId id="270" r:id="rId13"/>
+    <p:sldId id="271" r:id="rId14"/>
+    <p:sldId id="262" r:id="rId15"/>
+    <p:sldId id="263" r:id="rId16"/>
+    <p:sldId id="264" r:id="rId17"/>
+    <p:sldId id="265" r:id="rId18"/>
+    <p:sldId id="272" r:id="rId19"/>
+    <p:sldId id="273" r:id="rId20"/>
+    <p:sldId id="284" r:id="rId21"/>
+    <p:sldId id="285" r:id="rId22"/>
     <p:sldId id="275" r:id="rId23"/>
     <p:sldId id="276" r:id="rId24"/>
     <p:sldId id="277" r:id="rId25"/>
     <p:sldId id="278" r:id="rId26"/>
-    <p:sldId id="279" r:id="rId27"/>
+    <p:sldId id="286" r:id="rId27"/>
   </p:sldIdLst>
   <p:sldSz cx="9144000" cy="6858000" type="screen4x3"/>
   <p:notesSz cx="6858000" cy="9144000"/>
@@ -233,7 +233,7 @@
           <a:p>
             <a:fld id="{7F1E8714-DBD8-40D1-B91D-ED7ADF0B4851}" type="datetimeFigureOut">
               <a:rPr lang="en-US" smtClean="0"/>
-              <a:t>26-Apr-14</a:t>
+              <a:t>27-Apr-14</a:t>
             </a:fld>
             <a:endParaRPr lang="en-US"/>
           </a:p>
@@ -883,7 +883,7 @@
           <a:p>
             <a:fld id="{1D907E2C-8379-4EC9-ACC9-8CC049C576BA}" type="datetimeFigureOut">
               <a:rPr lang="en-US" smtClean="0"/>
-              <a:t>26-Apr-14</a:t>
+              <a:t>27-Apr-14</a:t>
             </a:fld>
             <a:endParaRPr lang="en-US"/>
           </a:p>
@@ -1053,7 +1053,7 @@
           <a:p>
             <a:fld id="{1D907E2C-8379-4EC9-ACC9-8CC049C576BA}" type="datetimeFigureOut">
               <a:rPr lang="en-US" smtClean="0"/>
-              <a:t>26-Apr-14</a:t>
+              <a:t>27-Apr-14</a:t>
             </a:fld>
             <a:endParaRPr lang="en-US"/>
           </a:p>
@@ -1233,7 +1233,7 @@
           <a:p>
             <a:fld id="{1D907E2C-8379-4EC9-ACC9-8CC049C576BA}" type="datetimeFigureOut">
               <a:rPr lang="en-US" smtClean="0"/>
-              <a:t>26-Apr-14</a:t>
+              <a:t>27-Apr-14</a:t>
             </a:fld>
             <a:endParaRPr lang="en-US"/>
           </a:p>
@@ -1403,7 +1403,7 @@
           <a:p>
             <a:fld id="{1D907E2C-8379-4EC9-ACC9-8CC049C576BA}" type="datetimeFigureOut">
               <a:rPr lang="en-US" smtClean="0"/>
-              <a:t>26-Apr-14</a:t>
+              <a:t>27-Apr-14</a:t>
             </a:fld>
             <a:endParaRPr lang="en-US"/>
           </a:p>
@@ -1649,7 +1649,7 @@
           <a:p>
             <a:fld id="{1D907E2C-8379-4EC9-ACC9-8CC049C576BA}" type="datetimeFigureOut">
               <a:rPr lang="en-US" smtClean="0"/>
-              <a:t>26-Apr-14</a:t>
+              <a:t>27-Apr-14</a:t>
             </a:fld>
             <a:endParaRPr lang="en-US"/>
           </a:p>
@@ -1881,7 +1881,7 @@
           <a:p>
             <a:fld id="{1D907E2C-8379-4EC9-ACC9-8CC049C576BA}" type="datetimeFigureOut">
               <a:rPr lang="en-US" smtClean="0"/>
-              <a:t>26-Apr-14</a:t>
+              <a:t>27-Apr-14</a:t>
             </a:fld>
             <a:endParaRPr lang="en-US"/>
           </a:p>
@@ -2248,7 +2248,7 @@
           <a:p>
             <a:fld id="{1D907E2C-8379-4EC9-ACC9-8CC049C576BA}" type="datetimeFigureOut">
               <a:rPr lang="en-US" smtClean="0"/>
-              <a:t>26-Apr-14</a:t>
+              <a:t>27-Apr-14</a:t>
             </a:fld>
             <a:endParaRPr lang="en-US"/>
           </a:p>
@@ -2366,7 +2366,7 @@
           <a:p>
             <a:fld id="{1D907E2C-8379-4EC9-ACC9-8CC049C576BA}" type="datetimeFigureOut">
               <a:rPr lang="en-US" smtClean="0"/>
-              <a:t>26-Apr-14</a:t>
+              <a:t>27-Apr-14</a:t>
             </a:fld>
             <a:endParaRPr lang="en-US"/>
           </a:p>
@@ -2461,7 +2461,7 @@
           <a:p>
             <a:fld id="{1D907E2C-8379-4EC9-ACC9-8CC049C576BA}" type="datetimeFigureOut">
               <a:rPr lang="en-US" smtClean="0"/>
-              <a:t>26-Apr-14</a:t>
+              <a:t>27-Apr-14</a:t>
             </a:fld>
             <a:endParaRPr lang="en-US"/>
           </a:p>
@@ -2738,7 +2738,7 @@
           <a:p>
             <a:fld id="{1D907E2C-8379-4EC9-ACC9-8CC049C576BA}" type="datetimeFigureOut">
               <a:rPr lang="en-US" smtClean="0"/>
-              <a:t>26-Apr-14</a:t>
+              <a:t>27-Apr-14</a:t>
             </a:fld>
             <a:endParaRPr lang="en-US"/>
           </a:p>
@@ -2991,7 +2991,7 @@
           <a:p>
             <a:fld id="{1D907E2C-8379-4EC9-ACC9-8CC049C576BA}" type="datetimeFigureOut">
               <a:rPr lang="en-US" smtClean="0"/>
-              <a:t>26-Apr-14</a:t>
+              <a:t>27-Apr-14</a:t>
             </a:fld>
             <a:endParaRPr lang="en-US"/>
           </a:p>
@@ -3204,7 +3204,7 @@
           <a:p>
             <a:fld id="{1D907E2C-8379-4EC9-ACC9-8CC049C576BA}" type="datetimeFigureOut">
               <a:rPr lang="en-US" smtClean="0"/>
-              <a:t>26-Apr-14</a:t>
+              <a:t>27-Apr-14</a:t>
             </a:fld>
             <a:endParaRPr lang="en-US"/>
           </a:p>
@@ -3621,19 +3621,19 @@
         </p:nvSpPr>
         <p:spPr>
           <a:xfrm>
-            <a:off x="2209800" y="1219200"/>
+            <a:off x="1538084" y="1247745"/>
             <a:ext cx="6172200" cy="1894362"/>
           </a:xfrm>
         </p:spPr>
         <p:txBody>
           <a:bodyPr>
-            <a:normAutofit fontScale="90000"/>
+            <a:normAutofit/>
           </a:bodyPr>
           <a:lstStyle/>
           <a:p>
             <a:r>
               <a:rPr lang="en-US" dirty="0" smtClean="0"/>
-              <a:t>Unified Context-Behavioral Ad Recommendation System</a:t>
+              <a:t>Unsupervised Sentiment Analysis</a:t>
             </a:r>
             <a:endParaRPr lang="en-US" dirty="0"/>
           </a:p>
@@ -3651,7 +3651,7 @@
         </p:nvSpPr>
         <p:spPr>
           <a:xfrm>
-            <a:off x="2209800" y="3352800"/>
+            <a:off x="1485900" y="3399853"/>
             <a:ext cx="6172200" cy="1371600"/>
           </a:xfrm>
         </p:spPr>
@@ -3665,7 +3665,6 @@
               <a:rPr lang="en-US" dirty="0" smtClean="0"/>
               <a:t>Students</a:t>
             </a:r>
-            <a:endParaRPr lang="en-US" dirty="0" smtClean="0"/>
           </a:p>
           <a:p>
             <a:r>
@@ -3712,7 +3711,7 @@
         </p:nvSpPr>
         <p:spPr>
           <a:xfrm>
-            <a:off x="2286000" y="5029200"/>
+            <a:off x="1538084" y="5029199"/>
             <a:ext cx="6172200" cy="1371600"/>
           </a:xfrm>
           <a:prstGeom prst="rect">
@@ -3761,20 +3760,6 @@
               </a:rPr>
               <a:t>Supervisors</a:t>
             </a:r>
-            <a:endParaRPr kumimoji="0" lang="en-US" sz="1800" b="1" i="0" u="none" strike="noStrike" kern="1200" cap="none" spc="0" normalizeH="0" baseline="0" noProof="0" dirty="0" smtClean="0">
-              <a:ln>
-                <a:noFill/>
-              </a:ln>
-              <a:solidFill>
-                <a:schemeClr val="tx2"/>
-              </a:solidFill>
-              <a:effectLst/>
-              <a:uLnTx/>
-              <a:uFillTx/>
-              <a:latin typeface="+mn-lt"/>
-              <a:ea typeface="+mn-ea"/>
-              <a:cs typeface="+mn-cs"/>
-            </a:endParaRPr>
           </a:p>
           <a:p>
             <a:pPr marL="0" marR="0" lvl="0" indent="0" algn="l" defTabSz="914400" rtl="0" eaLnBrk="1" fontAlgn="auto" latinLnBrk="0" hangingPunct="1">
@@ -3989,7 +3974,7 @@
         </p:blipFill>
         <p:spPr bwMode="auto">
           <a:xfrm>
-            <a:off x="2590800" y="304800"/>
+            <a:off x="1976234" y="281002"/>
             <a:ext cx="5295900" cy="923925"/>
           </a:xfrm>
           <a:prstGeom prst="rect">
@@ -4175,65 +4160,49 @@
           <a:lstStyle/>
           <a:p>
             <a:r>
-              <a:rPr lang="en-US" dirty="0" smtClean="0"/>
-              <a:t>Double Propagation – Steps</a:t>
+              <a:rPr lang="ro-RO" dirty="0" smtClean="0"/>
+              <a:t>Step 1 – </a:t>
+            </a:r>
+            <a:r>
+              <a:rPr lang="en-US" dirty="0" smtClean="0"/>
+              <a:t>Flow</a:t>
             </a:r>
             <a:endParaRPr lang="en-US" dirty="0"/>
           </a:p>
         </p:txBody>
       </p:sp>
-      <p:sp>
-        <p:nvSpPr>
-          <p:cNvPr id="3" name="Content Placeholder 2"/>
-          <p:cNvSpPr>
-            <a:spLocks noGrp="1"/>
-          </p:cNvSpPr>
+      <p:pic>
+        <p:nvPicPr>
+          <p:cNvPr id="4" name="Content Placeholder 3"/>
+          <p:cNvPicPr>
+            <a:picLocks noGrp="1" noChangeAspect="1"/>
+          </p:cNvPicPr>
           <p:nvPr>
             <p:ph idx="1"/>
           </p:nvPr>
-        </p:nvSpPr>
-        <p:spPr/>
-        <p:txBody>
-          <a:bodyPr>
-            <a:normAutofit/>
-          </a:bodyPr>
-          <a:lstStyle/>
-          <a:p>
-            <a:r>
-              <a:rPr lang="en-US" dirty="0" smtClean="0"/>
-              <a:t>Step 1 – Text </a:t>
-            </a:r>
-            <a:r>
-              <a:rPr lang="en-US" dirty="0"/>
-              <a:t>Retrieval, Preprocessing </a:t>
-            </a:r>
-            <a:r>
-              <a:rPr lang="en-US" dirty="0" smtClean="0"/>
-              <a:t>and Semantic Graph generation + caching</a:t>
-            </a:r>
-          </a:p>
-          <a:p>
-            <a:pPr lvl="1"/>
-            <a:r>
-              <a:rPr lang="en-US" dirty="0" smtClean="0"/>
-              <a:t>For each input file, generate an annotated SG for all sentences and save that graph in another file for possible later use (caching)</a:t>
-            </a:r>
-          </a:p>
-          <a:p>
-            <a:pPr marL="457200" lvl="1" indent="0">
-              <a:buNone/>
-            </a:pPr>
-            <a:endParaRPr lang="en-US" dirty="0" smtClean="0"/>
-          </a:p>
-          <a:p>
-            <a:pPr lvl="1"/>
-            <a:endParaRPr lang="en-US" dirty="0" smtClean="0"/>
-          </a:p>
-        </p:txBody>
-      </p:sp>
-      <p:sp>
-        <p:nvSpPr>
-          <p:cNvPr id="4" name="Title 1"/>
+        </p:nvPicPr>
+        <p:blipFill>
+          <a:blip r:embed="rId2">
+            <a:extLst>
+              <a:ext uri="{28A0092B-C50C-407E-A947-70E740481C1C}">
+                <a14:useLocalDpi xmlns:a14="http://schemas.microsoft.com/office/drawing/2010/main" val="0"/>
+              </a:ext>
+            </a:extLst>
+          </a:blip>
+          <a:stretch>
+            <a:fillRect/>
+          </a:stretch>
+        </p:blipFill>
+        <p:spPr>
+          <a:xfrm>
+            <a:off x="3282231" y="1600200"/>
+            <a:ext cx="2579537" cy="4525963"/>
+          </a:xfrm>
+        </p:spPr>
+      </p:pic>
+      <p:sp>
+        <p:nvSpPr>
+          <p:cNvPr id="5" name="Title 1"/>
           <p:cNvSpPr txBox="1">
             <a:spLocks/>
           </p:cNvSpPr>
@@ -4286,7 +4255,7 @@
                 <a:ea typeface="+mj-ea"/>
                 <a:cs typeface="+mj-cs"/>
               </a:rPr>
-              <a:t>Introduction</a:t>
+              <a:t>Pre-processing</a:t>
             </a:r>
             <a:endParaRPr kumimoji="0" lang="en-US" sz="3000" b="0" i="0" u="none" strike="noStrike" kern="1200" cap="small" spc="0" normalizeH="0" baseline="0" noProof="0" dirty="0">
               <a:ln>
@@ -4308,7 +4277,7 @@
     </p:spTree>
     <p:extLst>
       <p:ext uri="{BB962C8B-B14F-4D97-AF65-F5344CB8AC3E}">
-        <p14:creationId xmlns:p14="http://schemas.microsoft.com/office/powerpoint/2010/main" val="2859937743"/>
+        <p14:creationId xmlns:p14="http://schemas.microsoft.com/office/powerpoint/2010/main" val="3447496636"/>
       </p:ext>
     </p:extLst>
   </p:cSld>
@@ -4359,7 +4328,7 @@
           <a:p>
             <a:r>
               <a:rPr lang="en-US" dirty="0" smtClean="0"/>
-              <a:t>Double Propagation step</a:t>
+              <a:t>Step 2</a:t>
             </a:r>
             <a:endParaRPr lang="en-US" dirty="0"/>
           </a:p>
@@ -4381,30 +4350,41 @@
           <a:lstStyle/>
           <a:p>
             <a:r>
-              <a:rPr lang="en-US" dirty="0"/>
-              <a:t>Step 2 – Opinion Word and Target Extraction</a:t>
-            </a:r>
-          </a:p>
-          <a:p>
-            <a:pPr lvl="1"/>
-            <a:r>
-              <a:rPr lang="en-US" dirty="0"/>
-              <a:t>For each semantic graph, </a:t>
-            </a:r>
-            <a:r>
-              <a:rPr lang="en-US" dirty="0" smtClean="0"/>
-              <a:t>the Double Propagation algorithm is used to extract the opinion and the targets, using the rules which will be presented shortly.</a:t>
-            </a:r>
-            <a:r>
-              <a:rPr lang="en-US" dirty="0"/>
-              <a:t/>
-            </a:r>
-            <a:br>
-              <a:rPr lang="en-US" dirty="0"/>
-            </a:br>
+              <a:rPr lang="en-US" dirty="0" smtClean="0"/>
+              <a:t>“Hardcore” step</a:t>
+            </a:r>
+          </a:p>
+          <a:p>
+            <a:r>
+              <a:rPr lang="en-US" dirty="0" smtClean="0"/>
+              <a:t>Where the Double Propagation Algorithm is applied</a:t>
+            </a:r>
+            <a:endParaRPr lang="ro-RO" dirty="0" smtClean="0"/>
+          </a:p>
+          <a:p>
+            <a:r>
+              <a:rPr lang="ro-RO" dirty="0" smtClean="0"/>
+              <a:t>Input</a:t>
+            </a:r>
+            <a:r>
+              <a:rPr lang="en-US" dirty="0" smtClean="0"/>
+              <a:t>: Sematic Graphs</a:t>
+            </a:r>
+          </a:p>
+          <a:p>
+            <a:r>
+              <a:rPr lang="en-US" dirty="0" smtClean="0"/>
+              <a:t>Output: Tuples</a:t>
+            </a:r>
+          </a:p>
+          <a:p>
             <a:endParaRPr lang="en-US" dirty="0"/>
           </a:p>
           <a:p>
+            <a:r>
+              <a:rPr lang="en-US" dirty="0" smtClean="0"/>
+              <a:t>Tuple = pair/triple of words which are obtained from certain patterns</a:t>
+            </a:r>
             <a:endParaRPr lang="en-US" dirty="0"/>
           </a:p>
         </p:txBody>
@@ -4464,7 +4444,7 @@
                 <a:ea typeface="+mj-ea"/>
                 <a:cs typeface="+mj-cs"/>
               </a:rPr>
-              <a:t>Introduction</a:t>
+              <a:t>Extraction</a:t>
             </a:r>
             <a:endParaRPr kumimoji="0" lang="en-US" sz="3000" b="0" i="0" u="none" strike="noStrike" kern="1200" cap="small" spc="0" normalizeH="0" baseline="0" noProof="0" dirty="0">
               <a:ln>
@@ -4486,7 +4466,7 @@
     </p:spTree>
     <p:extLst>
       <p:ext uri="{BB962C8B-B14F-4D97-AF65-F5344CB8AC3E}">
-        <p14:creationId xmlns:p14="http://schemas.microsoft.com/office/powerpoint/2010/main" val="998824836"/>
+        <p14:creationId xmlns:p14="http://schemas.microsoft.com/office/powerpoint/2010/main" val="3721422020"/>
       </p:ext>
     </p:extLst>
   </p:cSld>
@@ -4523,57 +4503,62 @@
             <p:ph type="title"/>
           </p:nvPr>
         </p:nvSpPr>
-        <p:spPr/>
-        <p:txBody>
-          <a:bodyPr/>
-          <a:lstStyle/>
-          <a:p>
-            <a:r>
-              <a:rPr lang="en-US" dirty="0" smtClean="0"/>
-              <a:t>Double Propagation – Steps</a:t>
+        <p:spPr>
+          <a:xfrm>
+            <a:off x="2286000" y="-18691"/>
+            <a:ext cx="3657600" cy="1295400"/>
+          </a:xfrm>
+        </p:spPr>
+        <p:txBody>
+          <a:bodyPr>
+            <a:normAutofit/>
+          </a:bodyPr>
+          <a:lstStyle/>
+          <a:p>
+            <a:r>
+              <a:rPr lang="en-US" dirty="0" smtClean="0"/>
+              <a:t>Step 2 </a:t>
+            </a:r>
+            <a:br>
+              <a:rPr lang="en-US" dirty="0" smtClean="0"/>
+            </a:br>
+            <a:r>
+              <a:rPr lang="en-US" dirty="0" smtClean="0"/>
+              <a:t>Flow</a:t>
             </a:r>
             <a:endParaRPr lang="en-US" dirty="0"/>
           </a:p>
         </p:txBody>
       </p:sp>
-      <p:sp>
-        <p:nvSpPr>
-          <p:cNvPr id="3" name="Content Placeholder 2"/>
-          <p:cNvSpPr>
-            <a:spLocks noGrp="1"/>
-          </p:cNvSpPr>
+      <p:pic>
+        <p:nvPicPr>
+          <p:cNvPr id="7" name="Content Placeholder 6"/>
+          <p:cNvPicPr>
+            <a:picLocks noGrp="1" noChangeAspect="1"/>
+          </p:cNvPicPr>
           <p:nvPr>
             <p:ph idx="1"/>
           </p:nvPr>
-        </p:nvSpPr>
-        <p:spPr/>
-        <p:txBody>
-          <a:bodyPr/>
-          <a:lstStyle/>
-          <a:p>
-            <a:r>
-              <a:rPr lang="en-US" dirty="0" smtClean="0"/>
-              <a:t>Step 3 – Sentiment Polarity Assignment</a:t>
-            </a:r>
-          </a:p>
-          <a:p>
-            <a:pPr lvl="1"/>
-            <a:r>
-              <a:rPr lang="en-US" dirty="0" smtClean="0"/>
-              <a:t>For the extracted words, assign a polarity from a source like </a:t>
-            </a:r>
-            <a:r>
-              <a:rPr lang="en-US" dirty="0" err="1" smtClean="0"/>
-              <a:t>SentiWordNet</a:t>
-            </a:r>
-            <a:endParaRPr lang="en-US" dirty="0" smtClean="0"/>
-          </a:p>
-          <a:p>
-            <a:pPr lvl="1"/>
-            <a:endParaRPr lang="en-US" dirty="0" smtClean="0"/>
-          </a:p>
-        </p:txBody>
-      </p:sp>
+        </p:nvPicPr>
+        <p:blipFill>
+          <a:blip r:embed="rId2" cstate="print">
+            <a:extLst>
+              <a:ext uri="{28A0092B-C50C-407E-A947-70E740481C1C}">
+                <a14:useLocalDpi xmlns:a14="http://schemas.microsoft.com/office/drawing/2010/main" val="0"/>
+              </a:ext>
+            </a:extLst>
+          </a:blip>
+          <a:stretch>
+            <a:fillRect/>
+          </a:stretch>
+        </p:blipFill>
+        <p:spPr>
+          <a:xfrm>
+            <a:off x="2438400" y="1371600"/>
+            <a:ext cx="3600460" cy="5031792"/>
+          </a:xfrm>
+        </p:spPr>
+      </p:pic>
       <p:sp>
         <p:nvSpPr>
           <p:cNvPr id="4" name="Title 1"/>
@@ -4597,74 +4582,33 @@
           </a:bodyPr>
           <a:lstStyle/>
           <a:p>
-            <a:pPr marL="0" marR="0" lvl="0" indent="0" algn="r" defTabSz="914400" rtl="0" eaLnBrk="1" fontAlgn="auto" latinLnBrk="0" hangingPunct="1">
-              <a:lnSpc>
-                <a:spcPct val="100000"/>
-              </a:lnSpc>
+            <a:pPr lvl="0" algn="r">
               <a:spcBef>
                 <a:spcPct val="0"/>
               </a:spcBef>
-              <a:spcAft>
-                <a:spcPts val="0"/>
-              </a:spcAft>
-              <a:buClrTx/>
-              <a:buSzTx/>
-              <a:buFontTx/>
-              <a:buNone/>
-              <a:tabLst/>
               <a:defRPr/>
             </a:pPr>
             <a:r>
-              <a:rPr kumimoji="0" lang="en-US" sz="3000" b="0" i="0" u="none" strike="noStrike" kern="1200" cap="small" spc="0" normalizeH="0" baseline="0" noProof="0" dirty="0" smtClean="0">
-                <a:ln>
-                  <a:noFill/>
-                </a:ln>
+              <a:rPr lang="en-US" sz="3000" cap="small" dirty="0">
                 <a:solidFill>
                   <a:schemeClr val="tx2"/>
                 </a:solidFill>
-                <a:effectLst/>
-                <a:uLnTx/>
-                <a:uFillTx/>
-                <a:latin typeface="+mj-lt"/>
-                <a:ea typeface="+mj-ea"/>
-                <a:cs typeface="+mj-cs"/>
               </a:rPr>
-              <a:t>Introduction</a:t>
-            </a:r>
-            <a:endParaRPr kumimoji="0" lang="en-US" sz="3000" b="0" i="0" u="none" strike="noStrike" kern="1200" cap="small" spc="0" normalizeH="0" baseline="0" noProof="0" dirty="0">
-              <a:ln>
-                <a:noFill/>
-              </a:ln>
-              <a:solidFill>
-                <a:schemeClr val="tx2"/>
-              </a:solidFill>
-              <a:effectLst/>
-              <a:uLnTx/>
-              <a:uFillTx/>
-              <a:latin typeface="+mj-lt"/>
-              <a:ea typeface="+mj-ea"/>
-              <a:cs typeface="+mj-cs"/>
-            </a:endParaRPr>
+              <a:t>Extraction</a:t>
+            </a:r>
           </a:p>
         </p:txBody>
       </p:sp>
     </p:spTree>
     <p:extLst>
       <p:ext uri="{BB962C8B-B14F-4D97-AF65-F5344CB8AC3E}">
-        <p14:creationId xmlns:p14="http://schemas.microsoft.com/office/powerpoint/2010/main" val="120689731"/>
+        <p14:creationId xmlns:p14="http://schemas.microsoft.com/office/powerpoint/2010/main" val="3713769596"/>
       </p:ext>
     </p:extLst>
   </p:cSld>
   <p:clrMapOvr>
     <a:masterClrMapping/>
   </p:clrMapOvr>
-  <p:timing>
-    <p:tnLst>
-      <p:par>
-        <p:cTn id="1" dur="indefinite" restart="never" nodeType="tmRoot"/>
-      </p:par>
-    </p:tnLst>
-  </p:timing>
 </p:sld>
 </file>
 
@@ -4695,15 +4639,32 @@
             <p:ph type="title"/>
           </p:nvPr>
         </p:nvSpPr>
-        <p:spPr/>
-        <p:txBody>
-          <a:bodyPr/>
-          <a:lstStyle/>
-          <a:p>
-            <a:r>
-              <a:rPr lang="en-US" dirty="0" smtClean="0"/>
-              <a:t>General Architecture Overview</a:t>
-            </a:r>
+        <p:spPr>
+          <a:xfrm>
+            <a:off x="304800" y="304800"/>
+            <a:ext cx="8229600" cy="1143000"/>
+          </a:xfrm>
+        </p:spPr>
+        <p:txBody>
+          <a:bodyPr>
+            <a:normAutofit fontScale="90000"/>
+          </a:bodyPr>
+          <a:lstStyle/>
+          <a:p>
+            <a:r>
+              <a:rPr lang="en-US" dirty="0"/>
+              <a:t>Step 2 </a:t>
+            </a:r>
+            <a:br>
+              <a:rPr lang="en-US" dirty="0"/>
+            </a:br>
+            <a:r>
+              <a:rPr lang="en-US" dirty="0" smtClean="0"/>
+              <a:t>Flow Continued</a:t>
+            </a:r>
+            <a:br>
+              <a:rPr lang="en-US" dirty="0" smtClean="0"/>
+            </a:br>
             <a:endParaRPr lang="en-US" dirty="0"/>
           </a:p>
         </p:txBody>
@@ -4719,7 +4680,7 @@
           </p:nvPr>
         </p:nvPicPr>
         <p:blipFill>
-          <a:blip r:embed="rId2">
+          <a:blip r:embed="rId2" cstate="print">
             <a:extLst>
               <a:ext uri="{28A0092B-C50C-407E-A947-70E740481C1C}">
                 <a14:useLocalDpi xmlns:a14="http://schemas.microsoft.com/office/drawing/2010/main" val="0"/>
@@ -4732,8 +4693,8 @@
         </p:blipFill>
         <p:spPr>
           <a:xfrm>
-            <a:off x="457200" y="2424181"/>
-            <a:ext cx="8229600" cy="2878001"/>
+            <a:off x="2819400" y="1295400"/>
+            <a:ext cx="3200400" cy="4931497"/>
           </a:xfrm>
         </p:spPr>
       </p:pic>
@@ -4760,74 +4721,33 @@
           </a:bodyPr>
           <a:lstStyle/>
           <a:p>
-            <a:pPr marL="0" marR="0" lvl="0" indent="0" algn="r" defTabSz="914400" rtl="0" eaLnBrk="1" fontAlgn="auto" latinLnBrk="0" hangingPunct="1">
-              <a:lnSpc>
-                <a:spcPct val="100000"/>
-              </a:lnSpc>
+            <a:pPr lvl="0" algn="r">
               <a:spcBef>
                 <a:spcPct val="0"/>
               </a:spcBef>
-              <a:spcAft>
-                <a:spcPts val="0"/>
-              </a:spcAft>
-              <a:buClrTx/>
-              <a:buSzTx/>
-              <a:buFontTx/>
-              <a:buNone/>
-              <a:tabLst/>
               <a:defRPr/>
             </a:pPr>
             <a:r>
-              <a:rPr kumimoji="0" lang="en-US" sz="3000" b="0" i="0" u="none" strike="noStrike" kern="1200" cap="small" spc="0" normalizeH="0" baseline="0" noProof="0" dirty="0" smtClean="0">
-                <a:ln>
-                  <a:noFill/>
-                </a:ln>
+              <a:rPr lang="en-US" sz="3000" cap="small" dirty="0">
                 <a:solidFill>
                   <a:schemeClr val="tx2"/>
                 </a:solidFill>
-                <a:effectLst/>
-                <a:uLnTx/>
-                <a:uFillTx/>
-                <a:latin typeface="+mj-lt"/>
-                <a:ea typeface="+mj-ea"/>
-                <a:cs typeface="+mj-cs"/>
               </a:rPr>
-              <a:t>Introduction</a:t>
-            </a:r>
-            <a:endParaRPr kumimoji="0" lang="en-US" sz="3000" b="0" i="0" u="none" strike="noStrike" kern="1200" cap="small" spc="0" normalizeH="0" baseline="0" noProof="0" dirty="0">
-              <a:ln>
-                <a:noFill/>
-              </a:ln>
-              <a:solidFill>
-                <a:schemeClr val="tx2"/>
-              </a:solidFill>
-              <a:effectLst/>
-              <a:uLnTx/>
-              <a:uFillTx/>
-              <a:latin typeface="+mj-lt"/>
-              <a:ea typeface="+mj-ea"/>
-              <a:cs typeface="+mj-cs"/>
-            </a:endParaRPr>
+              <a:t>Extraction</a:t>
+            </a:r>
           </a:p>
         </p:txBody>
       </p:sp>
     </p:spTree>
     <p:extLst>
       <p:ext uri="{BB962C8B-B14F-4D97-AF65-F5344CB8AC3E}">
-        <p14:creationId xmlns:p14="http://schemas.microsoft.com/office/powerpoint/2010/main" val="1960539458"/>
+        <p14:creationId xmlns:p14="http://schemas.microsoft.com/office/powerpoint/2010/main" val="2834604523"/>
       </p:ext>
     </p:extLst>
   </p:cSld>
   <p:clrMapOvr>
     <a:masterClrMapping/>
   </p:clrMapOvr>
-  <p:timing>
-    <p:tnLst>
-      <p:par>
-        <p:cTn id="1" dur="indefinite" restart="never" nodeType="tmRoot"/>
-      </p:par>
-    </p:tnLst>
-  </p:timing>
 </p:sld>
 </file>
 
@@ -4860,53 +4780,83 @@
         </p:nvSpPr>
         <p:spPr/>
         <p:txBody>
+          <a:bodyPr>
+            <a:normAutofit/>
+          </a:bodyPr>
+          <a:lstStyle/>
+          <a:p>
+            <a:r>
+              <a:rPr lang="en-US" dirty="0" smtClean="0"/>
+              <a:t>Double </a:t>
+            </a:r>
+            <a:r>
+              <a:rPr lang="en-US" dirty="0" smtClean="0"/>
+              <a:t>Propagation based sentiment extraction (Unsupervised)</a:t>
+            </a:r>
+            <a:endParaRPr lang="en-US" dirty="0"/>
+          </a:p>
+        </p:txBody>
+      </p:sp>
+      <p:sp>
+        <p:nvSpPr>
+          <p:cNvPr id="3" name="Content Placeholder 2"/>
+          <p:cNvSpPr>
+            <a:spLocks noGrp="1"/>
+          </p:cNvSpPr>
+          <p:nvPr>
+            <p:ph idx="1"/>
+          </p:nvPr>
+        </p:nvSpPr>
+        <p:spPr/>
+        <p:txBody>
           <a:bodyPr/>
           <a:lstStyle/>
           <a:p>
             <a:r>
-              <a:rPr lang="ro-RO" dirty="0" smtClean="0"/>
-              <a:t>Step 1 – </a:t>
-            </a:r>
-            <a:r>
-              <a:rPr lang="en-US" dirty="0" smtClean="0"/>
-              <a:t>Flow</a:t>
+              <a:rPr lang="en-US" dirty="0" smtClean="0"/>
+              <a:t>Based on </a:t>
+            </a:r>
+            <a:r>
+              <a:rPr lang="en-US" i="1" dirty="0" smtClean="0"/>
+              <a:t>“Opinion Word Expansion and Target Extraction through Double Propagation, 2011” </a:t>
+            </a:r>
+            <a:r>
+              <a:rPr lang="en-US" dirty="0" smtClean="0"/>
+              <a:t>by </a:t>
+            </a:r>
+            <a:r>
+              <a:rPr lang="en-US" i="1" dirty="0" smtClean="0"/>
+              <a:t>Bing Liu.</a:t>
+            </a:r>
+          </a:p>
+          <a:p>
+            <a:r>
+              <a:rPr lang="en-US" dirty="0" smtClean="0"/>
+              <a:t>Using </a:t>
+            </a:r>
+            <a:r>
+              <a:rPr lang="en-US" b="1" i="1" dirty="0" smtClean="0"/>
+              <a:t>seed words</a:t>
+            </a:r>
+          </a:p>
+          <a:p>
+            <a:r>
+              <a:rPr lang="en-US" dirty="0" smtClean="0"/>
+              <a:t>Domain independence given by those seed words</a:t>
+            </a:r>
+          </a:p>
+          <a:p>
+            <a:r>
+              <a:rPr lang="en-US" dirty="0" smtClean="0"/>
+              <a:t>No learning involved</a:t>
             </a:r>
             <a:endParaRPr lang="en-US" dirty="0"/>
           </a:p>
         </p:txBody>
       </p:sp>
-      <p:pic>
-        <p:nvPicPr>
-          <p:cNvPr id="4" name="Content Placeholder 3"/>
-          <p:cNvPicPr>
-            <a:picLocks noGrp="1" noChangeAspect="1"/>
-          </p:cNvPicPr>
-          <p:nvPr>
-            <p:ph idx="1"/>
-          </p:nvPr>
-        </p:nvPicPr>
-        <p:blipFill>
-          <a:blip r:embed="rId2">
-            <a:extLst>
-              <a:ext uri="{28A0092B-C50C-407E-A947-70E740481C1C}">
-                <a14:useLocalDpi xmlns:a14="http://schemas.microsoft.com/office/drawing/2010/main" val="0"/>
-              </a:ext>
-            </a:extLst>
-          </a:blip>
-          <a:stretch>
-            <a:fillRect/>
-          </a:stretch>
-        </p:blipFill>
-        <p:spPr>
-          <a:xfrm>
-            <a:off x="3282231" y="1600200"/>
-            <a:ext cx="2579537" cy="4525963"/>
-          </a:xfrm>
-        </p:spPr>
-      </p:pic>
-      <p:sp>
-        <p:nvSpPr>
-          <p:cNvPr id="5" name="Title 1"/>
+      <p:sp>
+        <p:nvSpPr>
+          <p:cNvPr id="4" name="Title 1"/>
           <p:cNvSpPr txBox="1">
             <a:spLocks/>
           </p:cNvSpPr>
@@ -4927,61 +4877,27 @@
           </a:bodyPr>
           <a:lstStyle/>
           <a:p>
-            <a:pPr marL="0" marR="0" lvl="0" indent="0" algn="r" defTabSz="914400" rtl="0" eaLnBrk="1" fontAlgn="auto" latinLnBrk="0" hangingPunct="1">
-              <a:lnSpc>
-                <a:spcPct val="100000"/>
-              </a:lnSpc>
+            <a:pPr lvl="0" algn="r">
               <a:spcBef>
                 <a:spcPct val="0"/>
               </a:spcBef>
-              <a:spcAft>
-                <a:spcPts val="0"/>
-              </a:spcAft>
-              <a:buClrTx/>
-              <a:buSzTx/>
-              <a:buFontTx/>
-              <a:buNone/>
-              <a:tabLst/>
               <a:defRPr/>
             </a:pPr>
             <a:r>
-              <a:rPr kumimoji="0" lang="en-US" sz="3000" b="0" i="0" u="none" strike="noStrike" kern="1200" cap="small" spc="0" normalizeH="0" baseline="0" noProof="0" dirty="0" smtClean="0">
-                <a:ln>
-                  <a:noFill/>
-                </a:ln>
+              <a:rPr lang="en-US" sz="3000" cap="small" dirty="0">
                 <a:solidFill>
                   <a:schemeClr val="tx2"/>
                 </a:solidFill>
-                <a:effectLst/>
-                <a:uLnTx/>
-                <a:uFillTx/>
-                <a:latin typeface="+mj-lt"/>
-                <a:ea typeface="+mj-ea"/>
-                <a:cs typeface="+mj-cs"/>
               </a:rPr>
-              <a:t>Introduction</a:t>
-            </a:r>
-            <a:endParaRPr kumimoji="0" lang="en-US" sz="3000" b="0" i="0" u="none" strike="noStrike" kern="1200" cap="small" spc="0" normalizeH="0" baseline="0" noProof="0" dirty="0">
-              <a:ln>
-                <a:noFill/>
-              </a:ln>
-              <a:solidFill>
-                <a:schemeClr val="tx2"/>
-              </a:solidFill>
-              <a:effectLst/>
-              <a:uLnTx/>
-              <a:uFillTx/>
-              <a:latin typeface="+mj-lt"/>
-              <a:ea typeface="+mj-ea"/>
-              <a:cs typeface="+mj-cs"/>
-            </a:endParaRPr>
+              <a:t>Extraction</a:t>
+            </a:r>
           </a:p>
         </p:txBody>
       </p:sp>
     </p:spTree>
     <p:extLst>
       <p:ext uri="{BB962C8B-B14F-4D97-AF65-F5344CB8AC3E}">
-        <p14:creationId xmlns:p14="http://schemas.microsoft.com/office/powerpoint/2010/main" val="3447496636"/>
+        <p14:creationId xmlns:p14="http://schemas.microsoft.com/office/powerpoint/2010/main" val="1933639313"/>
       </p:ext>
     </p:extLst>
   </p:cSld>
@@ -5032,7 +4948,7 @@
           <a:p>
             <a:r>
               <a:rPr lang="en-US" dirty="0" smtClean="0"/>
-              <a:t>Step 1</a:t>
+              <a:t>Double Propagation – Steps</a:t>
             </a:r>
             <a:endParaRPr lang="en-US" dirty="0"/>
           </a:p>
@@ -5050,42 +4966,39 @@
         </p:nvSpPr>
         <p:spPr/>
         <p:txBody>
-          <a:bodyPr/>
-          <a:lstStyle/>
-          <a:p>
-            <a:r>
-              <a:rPr lang="en-US" dirty="0" smtClean="0"/>
-              <a:t>Input format: any text files containing sentences</a:t>
-            </a:r>
-          </a:p>
-          <a:p>
-            <a:r>
-              <a:rPr lang="en-US" dirty="0" smtClean="0"/>
-              <a:t>Output format: Semantic Graphs</a:t>
-            </a:r>
-            <a:endParaRPr lang="en-US" dirty="0"/>
-          </a:p>
-          <a:p>
-            <a:r>
-              <a:rPr lang="en-US" dirty="0" smtClean="0"/>
-              <a:t>Semantic Graph Generation = MOST TIME CONSUMING PROCESS</a:t>
+          <a:bodyPr>
+            <a:normAutofit/>
+          </a:bodyPr>
+          <a:lstStyle/>
+          <a:p>
+            <a:r>
+              <a:rPr lang="en-US" dirty="0" smtClean="0"/>
+              <a:t>Step 1 – Text </a:t>
+            </a:r>
+            <a:r>
+              <a:rPr lang="en-US" dirty="0"/>
+              <a:t>Retrieval, Preprocessing </a:t>
+            </a:r>
+            <a:r>
+              <a:rPr lang="en-US" dirty="0" smtClean="0"/>
+              <a:t>and Semantic Graph generation + caching</a:t>
             </a:r>
           </a:p>
           <a:p>
             <a:pPr lvl="1"/>
             <a:r>
               <a:rPr lang="en-US" dirty="0" smtClean="0"/>
-              <a:t>Ex: 2000 line text file = 10&lt; minutes to generate SGs</a:t>
-            </a:r>
+              <a:t>For each input file, generate an annotated SG for all sentences and save that graph in another file for possible later use (caching)</a:t>
+            </a:r>
+          </a:p>
+          <a:p>
+            <a:pPr marL="457200" lvl="1" indent="0">
+              <a:buNone/>
+            </a:pPr>
+            <a:endParaRPr lang="en-US" dirty="0" smtClean="0"/>
           </a:p>
           <a:p>
             <a:pPr lvl="1"/>
-            <a:r>
-              <a:rPr lang="en-US" dirty="0" smtClean="0">
-                <a:sym typeface="Wingdings" pitchFamily="2" charset="2"/>
-              </a:rPr>
-              <a:t> The need to cache results for future use</a:t>
-            </a:r>
             <a:endParaRPr lang="en-US" dirty="0" smtClean="0"/>
           </a:p>
         </p:txBody>
@@ -5113,67 +5026,40 @@
           </a:bodyPr>
           <a:lstStyle/>
           <a:p>
-            <a:pPr marL="0" marR="0" lvl="0" indent="0" algn="r" defTabSz="914400" rtl="0" eaLnBrk="1" fontAlgn="auto" latinLnBrk="0" hangingPunct="1">
-              <a:lnSpc>
-                <a:spcPct val="100000"/>
-              </a:lnSpc>
+            <a:pPr lvl="0" algn="r">
               <a:spcBef>
                 <a:spcPct val="0"/>
               </a:spcBef>
-              <a:spcAft>
-                <a:spcPts val="0"/>
-              </a:spcAft>
-              <a:buClrTx/>
-              <a:buSzTx/>
-              <a:buFontTx/>
-              <a:buNone/>
-              <a:tabLst/>
               <a:defRPr/>
             </a:pPr>
             <a:r>
-              <a:rPr kumimoji="0" lang="en-US" sz="3000" b="0" i="0" u="none" strike="noStrike" kern="1200" cap="small" spc="0" normalizeH="0" baseline="0" noProof="0" dirty="0" smtClean="0">
-                <a:ln>
-                  <a:noFill/>
-                </a:ln>
+              <a:rPr lang="en-US" sz="3000" cap="small" dirty="0">
                 <a:solidFill>
                   <a:schemeClr val="tx2"/>
                 </a:solidFill>
-                <a:effectLst/>
-                <a:uLnTx/>
-                <a:uFillTx/>
-                <a:latin typeface="+mj-lt"/>
-                <a:ea typeface="+mj-ea"/>
-                <a:cs typeface="+mj-cs"/>
               </a:rPr>
-              <a:t>Introduction</a:t>
-            </a:r>
-            <a:endParaRPr kumimoji="0" lang="en-US" sz="3000" b="0" i="0" u="none" strike="noStrike" kern="1200" cap="small" spc="0" normalizeH="0" baseline="0" noProof="0" dirty="0">
-              <a:ln>
-                <a:noFill/>
-              </a:ln>
-              <a:solidFill>
-                <a:schemeClr val="tx2"/>
-              </a:solidFill>
-              <a:effectLst/>
-              <a:uLnTx/>
-              <a:uFillTx/>
-              <a:latin typeface="+mj-lt"/>
-              <a:ea typeface="+mj-ea"/>
-              <a:cs typeface="+mj-cs"/>
-            </a:endParaRPr>
+              <a:t>Extraction</a:t>
+            </a:r>
           </a:p>
         </p:txBody>
       </p:sp>
     </p:spTree>
     <p:extLst>
       <p:ext uri="{BB962C8B-B14F-4D97-AF65-F5344CB8AC3E}">
-        <p14:creationId xmlns:p14="http://schemas.microsoft.com/office/powerpoint/2010/main" val="1408269909"/>
+        <p14:creationId xmlns:p14="http://schemas.microsoft.com/office/powerpoint/2010/main" val="2859937743"/>
       </p:ext>
     </p:extLst>
   </p:cSld>
   <p:clrMapOvr>
     <a:masterClrMapping/>
   </p:clrMapOvr>
+  <p:timing>
+    <p:tnLst>
+      <p:par>
+        <p:cTn id="1" dur="indefinite" restart="never" nodeType="tmRoot"/>
+      </p:par>
+    </p:tnLst>
+  </p:timing>
 </p:sld>
 </file>
 
@@ -5211,7 +5097,7 @@
           <a:p>
             <a:r>
               <a:rPr lang="en-US" dirty="0" smtClean="0"/>
-              <a:t>Step 2</a:t>
+              <a:t>Double Propagation step</a:t>
             </a:r>
             <a:endParaRPr lang="en-US" dirty="0"/>
           </a:p>
@@ -5233,41 +5119,30 @@
           <a:lstStyle/>
           <a:p>
             <a:r>
-              <a:rPr lang="en-US" dirty="0" smtClean="0"/>
-              <a:t>“Hardcore” step</a:t>
-            </a:r>
-          </a:p>
-          <a:p>
-            <a:r>
-              <a:rPr lang="en-US" dirty="0" smtClean="0"/>
-              <a:t>Where the Double Propagation Algorithm is applied</a:t>
-            </a:r>
-            <a:endParaRPr lang="ro-RO" dirty="0" smtClean="0"/>
-          </a:p>
-          <a:p>
-            <a:r>
-              <a:rPr lang="ro-RO" dirty="0" smtClean="0"/>
-              <a:t>Input</a:t>
-            </a:r>
-            <a:r>
-              <a:rPr lang="en-US" dirty="0" smtClean="0"/>
-              <a:t>: Sematic Graphs</a:t>
-            </a:r>
-          </a:p>
-          <a:p>
-            <a:r>
-              <a:rPr lang="en-US" dirty="0" smtClean="0"/>
-              <a:t>Output: Tuples</a:t>
-            </a:r>
-          </a:p>
-          <a:p>
+              <a:rPr lang="en-US" dirty="0"/>
+              <a:t>Step 2 – Opinion Word and Target Extraction</a:t>
+            </a:r>
+          </a:p>
+          <a:p>
+            <a:pPr lvl="1"/>
+            <a:r>
+              <a:rPr lang="en-US" dirty="0"/>
+              <a:t>For each semantic graph, </a:t>
+            </a:r>
+            <a:r>
+              <a:rPr lang="en-US" dirty="0" smtClean="0"/>
+              <a:t>the Double Propagation algorithm is used to extract the opinion and the targets, using the rules which will be presented shortly.</a:t>
+            </a:r>
+            <a:r>
+              <a:rPr lang="en-US" dirty="0"/>
+              <a:t/>
+            </a:r>
+            <a:br>
+              <a:rPr lang="en-US" dirty="0"/>
+            </a:br>
             <a:endParaRPr lang="en-US" dirty="0"/>
           </a:p>
           <a:p>
-            <a:r>
-              <a:rPr lang="en-US" dirty="0" smtClean="0"/>
-              <a:t>Tuple = pair/triple of words which are obtained from certain patterns</a:t>
-            </a:r>
             <a:endParaRPr lang="en-US" dirty="0"/>
           </a:p>
         </p:txBody>
@@ -5295,61 +5170,27 @@
           </a:bodyPr>
           <a:lstStyle/>
           <a:p>
-            <a:pPr marL="0" marR="0" lvl="0" indent="0" algn="r" defTabSz="914400" rtl="0" eaLnBrk="1" fontAlgn="auto" latinLnBrk="0" hangingPunct="1">
-              <a:lnSpc>
-                <a:spcPct val="100000"/>
-              </a:lnSpc>
+            <a:pPr lvl="0" algn="r">
               <a:spcBef>
                 <a:spcPct val="0"/>
               </a:spcBef>
-              <a:spcAft>
-                <a:spcPts val="0"/>
-              </a:spcAft>
-              <a:buClrTx/>
-              <a:buSzTx/>
-              <a:buFontTx/>
-              <a:buNone/>
-              <a:tabLst/>
               <a:defRPr/>
             </a:pPr>
             <a:r>
-              <a:rPr kumimoji="0" lang="en-US" sz="3000" b="0" i="0" u="none" strike="noStrike" kern="1200" cap="small" spc="0" normalizeH="0" baseline="0" noProof="0" dirty="0" smtClean="0">
-                <a:ln>
-                  <a:noFill/>
-                </a:ln>
+              <a:rPr lang="en-US" sz="3000" cap="small" dirty="0">
                 <a:solidFill>
                   <a:schemeClr val="tx2"/>
                 </a:solidFill>
-                <a:effectLst/>
-                <a:uLnTx/>
-                <a:uFillTx/>
-                <a:latin typeface="+mj-lt"/>
-                <a:ea typeface="+mj-ea"/>
-                <a:cs typeface="+mj-cs"/>
               </a:rPr>
-              <a:t>Introduction</a:t>
-            </a:r>
-            <a:endParaRPr kumimoji="0" lang="en-US" sz="3000" b="0" i="0" u="none" strike="noStrike" kern="1200" cap="small" spc="0" normalizeH="0" baseline="0" noProof="0" dirty="0">
-              <a:ln>
-                <a:noFill/>
-              </a:ln>
-              <a:solidFill>
-                <a:schemeClr val="tx2"/>
-              </a:solidFill>
-              <a:effectLst/>
-              <a:uLnTx/>
-              <a:uFillTx/>
-              <a:latin typeface="+mj-lt"/>
-              <a:ea typeface="+mj-ea"/>
-              <a:cs typeface="+mj-cs"/>
-            </a:endParaRPr>
+              <a:t>Extraction</a:t>
+            </a:r>
           </a:p>
         </p:txBody>
       </p:sp>
     </p:spTree>
     <p:extLst>
       <p:ext uri="{BB962C8B-B14F-4D97-AF65-F5344CB8AC3E}">
-        <p14:creationId xmlns:p14="http://schemas.microsoft.com/office/powerpoint/2010/main" val="3721422020"/>
+        <p14:creationId xmlns:p14="http://schemas.microsoft.com/office/powerpoint/2010/main" val="998824836"/>
       </p:ext>
     </p:extLst>
   </p:cSld>
@@ -5386,62 +5227,57 @@
             <p:ph type="title"/>
           </p:nvPr>
         </p:nvSpPr>
-        <p:spPr>
-          <a:xfrm>
-            <a:off x="2286000" y="-18691"/>
-            <a:ext cx="3657600" cy="1295400"/>
-          </a:xfrm>
-        </p:spPr>
-        <p:txBody>
-          <a:bodyPr>
-            <a:normAutofit/>
-          </a:bodyPr>
-          <a:lstStyle/>
-          <a:p>
-            <a:r>
-              <a:rPr lang="en-US" dirty="0" smtClean="0"/>
-              <a:t>Step 2 </a:t>
-            </a:r>
-            <a:br>
-              <a:rPr lang="en-US" dirty="0" smtClean="0"/>
-            </a:br>
-            <a:r>
-              <a:rPr lang="en-US" dirty="0" smtClean="0"/>
-              <a:t>Flow</a:t>
+        <p:spPr/>
+        <p:txBody>
+          <a:bodyPr/>
+          <a:lstStyle/>
+          <a:p>
+            <a:r>
+              <a:rPr lang="en-US" dirty="0" smtClean="0"/>
+              <a:t>Double Propagation – Steps</a:t>
             </a:r>
             <a:endParaRPr lang="en-US" dirty="0"/>
           </a:p>
         </p:txBody>
       </p:sp>
-      <p:pic>
-        <p:nvPicPr>
-          <p:cNvPr id="7" name="Content Placeholder 6"/>
-          <p:cNvPicPr>
-            <a:picLocks noGrp="1" noChangeAspect="1"/>
-          </p:cNvPicPr>
+      <p:sp>
+        <p:nvSpPr>
+          <p:cNvPr id="3" name="Content Placeholder 2"/>
+          <p:cNvSpPr>
+            <a:spLocks noGrp="1"/>
+          </p:cNvSpPr>
           <p:nvPr>
             <p:ph idx="1"/>
           </p:nvPr>
-        </p:nvPicPr>
-        <p:blipFill>
-          <a:blip r:embed="rId2" cstate="print">
-            <a:extLst>
-              <a:ext uri="{28A0092B-C50C-407E-A947-70E740481C1C}">
-                <a14:useLocalDpi xmlns:a14="http://schemas.microsoft.com/office/drawing/2010/main" val="0"/>
-              </a:ext>
-            </a:extLst>
-          </a:blip>
-          <a:stretch>
-            <a:fillRect/>
-          </a:stretch>
-        </p:blipFill>
-        <p:spPr>
-          <a:xfrm>
-            <a:off x="2438400" y="1371600"/>
-            <a:ext cx="3600460" cy="5031792"/>
-          </a:xfrm>
-        </p:spPr>
-      </p:pic>
+        </p:nvSpPr>
+        <p:spPr/>
+        <p:txBody>
+          <a:bodyPr/>
+          <a:lstStyle/>
+          <a:p>
+            <a:r>
+              <a:rPr lang="en-US" dirty="0" smtClean="0"/>
+              <a:t>Step 3 – Sentiment Polarity Assignment</a:t>
+            </a:r>
+          </a:p>
+          <a:p>
+            <a:pPr lvl="1"/>
+            <a:r>
+              <a:rPr lang="en-US" dirty="0" smtClean="0"/>
+              <a:t>For the extracted words, assign a polarity from a source like </a:t>
+            </a:r>
+            <a:r>
+              <a:rPr lang="en-US" dirty="0" err="1" smtClean="0"/>
+              <a:t>SentiWordNet</a:t>
+            </a:r>
+            <a:endParaRPr lang="en-US" dirty="0" smtClean="0"/>
+          </a:p>
+          <a:p>
+            <a:pPr lvl="1"/>
+            <a:endParaRPr lang="en-US" dirty="0" smtClean="0"/>
+          </a:p>
+        </p:txBody>
+      </p:sp>
       <p:sp>
         <p:nvSpPr>
           <p:cNvPr id="4" name="Title 1"/>
@@ -5465,67 +5301,40 @@
           </a:bodyPr>
           <a:lstStyle/>
           <a:p>
-            <a:pPr marL="0" marR="0" lvl="0" indent="0" algn="r" defTabSz="914400" rtl="0" eaLnBrk="1" fontAlgn="auto" latinLnBrk="0" hangingPunct="1">
-              <a:lnSpc>
-                <a:spcPct val="100000"/>
-              </a:lnSpc>
+            <a:pPr lvl="0" algn="r">
               <a:spcBef>
                 <a:spcPct val="0"/>
               </a:spcBef>
-              <a:spcAft>
-                <a:spcPts val="0"/>
-              </a:spcAft>
-              <a:buClrTx/>
-              <a:buSzTx/>
-              <a:buFontTx/>
-              <a:buNone/>
-              <a:tabLst/>
               <a:defRPr/>
             </a:pPr>
             <a:r>
-              <a:rPr kumimoji="0" lang="en-US" sz="3000" b="0" i="0" u="none" strike="noStrike" kern="1200" cap="small" spc="0" normalizeH="0" baseline="0" noProof="0" dirty="0" smtClean="0">
-                <a:ln>
-                  <a:noFill/>
-                </a:ln>
+              <a:rPr lang="en-US" sz="3000" cap="small" dirty="0">
                 <a:solidFill>
                   <a:schemeClr val="tx2"/>
                 </a:solidFill>
-                <a:effectLst/>
-                <a:uLnTx/>
-                <a:uFillTx/>
-                <a:latin typeface="+mj-lt"/>
-                <a:ea typeface="+mj-ea"/>
-                <a:cs typeface="+mj-cs"/>
               </a:rPr>
-              <a:t>Introduction</a:t>
-            </a:r>
-            <a:endParaRPr kumimoji="0" lang="en-US" sz="3000" b="0" i="0" u="none" strike="noStrike" kern="1200" cap="small" spc="0" normalizeH="0" baseline="0" noProof="0" dirty="0">
-              <a:ln>
-                <a:noFill/>
-              </a:ln>
-              <a:solidFill>
-                <a:schemeClr val="tx2"/>
-              </a:solidFill>
-              <a:effectLst/>
-              <a:uLnTx/>
-              <a:uFillTx/>
-              <a:latin typeface="+mj-lt"/>
-              <a:ea typeface="+mj-ea"/>
-              <a:cs typeface="+mj-cs"/>
-            </a:endParaRPr>
+              <a:t>Extraction</a:t>
+            </a:r>
           </a:p>
         </p:txBody>
       </p:sp>
     </p:spTree>
     <p:extLst>
       <p:ext uri="{BB962C8B-B14F-4D97-AF65-F5344CB8AC3E}">
-        <p14:creationId xmlns:p14="http://schemas.microsoft.com/office/powerpoint/2010/main" val="3713769596"/>
+        <p14:creationId xmlns:p14="http://schemas.microsoft.com/office/powerpoint/2010/main" val="120689731"/>
       </p:ext>
     </p:extLst>
   </p:cSld>
   <p:clrMapOvr>
     <a:masterClrMapping/>
   </p:clrMapOvr>
+  <p:timing>
+    <p:tnLst>
+      <p:par>
+        <p:cTn id="1" dur="indefinite" restart="never" nodeType="tmRoot"/>
+      </p:par>
+    </p:tnLst>
+  </p:timing>
 </p:sld>
 </file>
 
@@ -5556,32 +5365,15 @@
             <p:ph type="title"/>
           </p:nvPr>
         </p:nvSpPr>
-        <p:spPr>
-          <a:xfrm>
-            <a:off x="304800" y="304800"/>
-            <a:ext cx="8229600" cy="1143000"/>
-          </a:xfrm>
-        </p:spPr>
-        <p:txBody>
-          <a:bodyPr>
-            <a:normAutofit fontScale="90000"/>
-          </a:bodyPr>
-          <a:lstStyle/>
-          <a:p>
-            <a:r>
-              <a:rPr lang="en-US" dirty="0"/>
-              <a:t>Step 2 </a:t>
-            </a:r>
-            <a:br>
-              <a:rPr lang="en-US" dirty="0"/>
-            </a:br>
-            <a:r>
-              <a:rPr lang="en-US" dirty="0" smtClean="0"/>
-              <a:t>Flow Continued</a:t>
-            </a:r>
-            <a:br>
-              <a:rPr lang="en-US" dirty="0" smtClean="0"/>
-            </a:br>
+        <p:spPr/>
+        <p:txBody>
+          <a:bodyPr/>
+          <a:lstStyle/>
+          <a:p>
+            <a:r>
+              <a:rPr lang="en-US" dirty="0" smtClean="0"/>
+              <a:t>Step 2 – D.P.A</a:t>
+            </a:r>
             <a:endParaRPr lang="en-US" dirty="0"/>
           </a:p>
         </p:txBody>
@@ -5597,7 +5389,7 @@
           </p:nvPr>
         </p:nvPicPr>
         <p:blipFill>
-          <a:blip r:embed="rId2" cstate="print">
+          <a:blip r:embed="rId2">
             <a:extLst>
               <a:ext uri="{28A0092B-C50C-407E-A947-70E740481C1C}">
                 <a14:useLocalDpi xmlns:a14="http://schemas.microsoft.com/office/drawing/2010/main" val="0"/>
@@ -5610,8 +5402,8 @@
         </p:blipFill>
         <p:spPr>
           <a:xfrm>
-            <a:off x="2819400" y="1295400"/>
-            <a:ext cx="3200400" cy="4931497"/>
+            <a:off x="1176288" y="1600200"/>
+            <a:ext cx="6791423" cy="4525963"/>
           </a:xfrm>
         </p:spPr>
       </p:pic>
@@ -5638,67 +5430,40 @@
           </a:bodyPr>
           <a:lstStyle/>
           <a:p>
-            <a:pPr marL="0" marR="0" lvl="0" indent="0" algn="r" defTabSz="914400" rtl="0" eaLnBrk="1" fontAlgn="auto" latinLnBrk="0" hangingPunct="1">
-              <a:lnSpc>
-                <a:spcPct val="100000"/>
-              </a:lnSpc>
+            <a:pPr lvl="0" algn="r">
               <a:spcBef>
                 <a:spcPct val="0"/>
               </a:spcBef>
-              <a:spcAft>
-                <a:spcPts val="0"/>
-              </a:spcAft>
-              <a:buClrTx/>
-              <a:buSzTx/>
-              <a:buFontTx/>
-              <a:buNone/>
-              <a:tabLst/>
               <a:defRPr/>
             </a:pPr>
             <a:r>
-              <a:rPr kumimoji="0" lang="en-US" sz="3000" b="0" i="0" u="none" strike="noStrike" kern="1200" cap="small" spc="0" normalizeH="0" baseline="0" noProof="0" dirty="0" smtClean="0">
-                <a:ln>
-                  <a:noFill/>
-                </a:ln>
+              <a:rPr lang="en-US" sz="3000" cap="small" dirty="0">
                 <a:solidFill>
                   <a:schemeClr val="tx2"/>
                 </a:solidFill>
-                <a:effectLst/>
-                <a:uLnTx/>
-                <a:uFillTx/>
-                <a:latin typeface="+mj-lt"/>
-                <a:ea typeface="+mj-ea"/>
-                <a:cs typeface="+mj-cs"/>
               </a:rPr>
-              <a:t>Introduction</a:t>
-            </a:r>
-            <a:endParaRPr kumimoji="0" lang="en-US" sz="3000" b="0" i="0" u="none" strike="noStrike" kern="1200" cap="small" spc="0" normalizeH="0" baseline="0" noProof="0" dirty="0">
-              <a:ln>
-                <a:noFill/>
-              </a:ln>
-              <a:solidFill>
-                <a:schemeClr val="tx2"/>
-              </a:solidFill>
-              <a:effectLst/>
-              <a:uLnTx/>
-              <a:uFillTx/>
-              <a:latin typeface="+mj-lt"/>
-              <a:ea typeface="+mj-ea"/>
-              <a:cs typeface="+mj-cs"/>
-            </a:endParaRPr>
+              <a:t>Extraction</a:t>
+            </a:r>
           </a:p>
         </p:txBody>
       </p:sp>
     </p:spTree>
     <p:extLst>
       <p:ext uri="{BB962C8B-B14F-4D97-AF65-F5344CB8AC3E}">
-        <p14:creationId xmlns:p14="http://schemas.microsoft.com/office/powerpoint/2010/main" val="2834604523"/>
+        <p14:creationId xmlns:p14="http://schemas.microsoft.com/office/powerpoint/2010/main" val="4103223663"/>
       </p:ext>
     </p:extLst>
   </p:cSld>
   <p:clrMapOvr>
     <a:masterClrMapping/>
   </p:clrMapOvr>
+  <p:timing>
+    <p:tnLst>
+      <p:par>
+        <p:cTn id="1" dur="indefinite" restart="never" nodeType="tmRoot"/>
+      </p:par>
+    </p:tnLst>
+  </p:timing>
 </p:sld>
 </file>
 
@@ -5736,7 +5501,7 @@
           <a:p>
             <a:r>
               <a:rPr lang="en-US" dirty="0" smtClean="0"/>
-              <a:t>Step 2 – D.P.A</a:t>
+              <a:t>Step 2 – Extraction Rules</a:t>
             </a:r>
             <a:endParaRPr lang="en-US" dirty="0"/>
           </a:p>
@@ -5744,7 +5509,7 @@
       </p:sp>
       <p:pic>
         <p:nvPicPr>
-          <p:cNvPr id="4" name="Content Placeholder 3"/>
+          <p:cNvPr id="5" name="Content Placeholder 4"/>
           <p:cNvPicPr>
             <a:picLocks noGrp="1" noChangeAspect="1"/>
           </p:cNvPicPr>
@@ -5766,14 +5531,14 @@
         </p:blipFill>
         <p:spPr>
           <a:xfrm>
-            <a:off x="1176288" y="1600200"/>
-            <a:ext cx="6791423" cy="4525963"/>
+            <a:off x="1625240" y="1600200"/>
+            <a:ext cx="5893520" cy="4525963"/>
           </a:xfrm>
         </p:spPr>
       </p:pic>
       <p:sp>
         <p:nvSpPr>
-          <p:cNvPr id="5" name="Title 1"/>
+          <p:cNvPr id="4" name="Title 1"/>
           <p:cNvSpPr txBox="1">
             <a:spLocks/>
           </p:cNvSpPr>
@@ -5794,61 +5559,27 @@
           </a:bodyPr>
           <a:lstStyle/>
           <a:p>
-            <a:pPr marL="0" marR="0" lvl="0" indent="0" algn="r" defTabSz="914400" rtl="0" eaLnBrk="1" fontAlgn="auto" latinLnBrk="0" hangingPunct="1">
-              <a:lnSpc>
-                <a:spcPct val="100000"/>
-              </a:lnSpc>
+            <a:pPr lvl="0" algn="r">
               <a:spcBef>
                 <a:spcPct val="0"/>
               </a:spcBef>
-              <a:spcAft>
-                <a:spcPts val="0"/>
-              </a:spcAft>
-              <a:buClrTx/>
-              <a:buSzTx/>
-              <a:buFontTx/>
-              <a:buNone/>
-              <a:tabLst/>
               <a:defRPr/>
             </a:pPr>
             <a:r>
-              <a:rPr kumimoji="0" lang="en-US" sz="3000" b="0" i="0" u="none" strike="noStrike" kern="1200" cap="small" spc="0" normalizeH="0" baseline="0" noProof="0" dirty="0" smtClean="0">
-                <a:ln>
-                  <a:noFill/>
-                </a:ln>
+              <a:rPr lang="en-US" sz="3000" cap="small" dirty="0">
                 <a:solidFill>
                   <a:schemeClr val="tx2"/>
                 </a:solidFill>
-                <a:effectLst/>
-                <a:uLnTx/>
-                <a:uFillTx/>
-                <a:latin typeface="+mj-lt"/>
-                <a:ea typeface="+mj-ea"/>
-                <a:cs typeface="+mj-cs"/>
               </a:rPr>
-              <a:t>Introduction</a:t>
-            </a:r>
-            <a:endParaRPr kumimoji="0" lang="en-US" sz="3000" b="0" i="0" u="none" strike="noStrike" kern="1200" cap="small" spc="0" normalizeH="0" baseline="0" noProof="0" dirty="0">
-              <a:ln>
-                <a:noFill/>
-              </a:ln>
-              <a:solidFill>
-                <a:schemeClr val="tx2"/>
-              </a:solidFill>
-              <a:effectLst/>
-              <a:uLnTx/>
-              <a:uFillTx/>
-              <a:latin typeface="+mj-lt"/>
-              <a:ea typeface="+mj-ea"/>
-              <a:cs typeface="+mj-cs"/>
-            </a:endParaRPr>
+              <a:t>Extraction</a:t>
+            </a:r>
           </a:p>
         </p:txBody>
       </p:sp>
     </p:spTree>
     <p:extLst>
       <p:ext uri="{BB962C8B-B14F-4D97-AF65-F5344CB8AC3E}">
-        <p14:creationId xmlns:p14="http://schemas.microsoft.com/office/powerpoint/2010/main" val="4103223663"/>
+        <p14:creationId xmlns:p14="http://schemas.microsoft.com/office/powerpoint/2010/main" val="541022935"/>
       </p:ext>
     </p:extLst>
   </p:cSld>
@@ -5936,25 +5667,42 @@
           <a:p>
             <a:r>
               <a:rPr lang="en-US" dirty="0" smtClean="0"/>
-              <a:t>Related Work</a:t>
-            </a:r>
-          </a:p>
-          <a:p>
-            <a:r>
-              <a:rPr lang="en-US" dirty="0" smtClean="0"/>
-              <a:t>Analysis and Design</a:t>
-            </a:r>
-          </a:p>
-          <a:p>
-            <a:r>
-              <a:rPr lang="en-US" dirty="0" smtClean="0"/>
-              <a:t>Implementation status</a:t>
-            </a:r>
-          </a:p>
-          <a:p>
-            <a:r>
-              <a:rPr lang="en-US" dirty="0" smtClean="0"/>
-              <a:t>Current Results</a:t>
+              <a:t>The proposed solution	</a:t>
+            </a:r>
+            <a:endParaRPr lang="en-US" dirty="0" smtClean="0"/>
+          </a:p>
+          <a:p>
+            <a:pPr lvl="1"/>
+            <a:r>
+              <a:rPr lang="en-US" dirty="0" smtClean="0"/>
+              <a:t>Pre-processing step</a:t>
+            </a:r>
+            <a:endParaRPr lang="en-US" dirty="0" smtClean="0"/>
+          </a:p>
+          <a:p>
+            <a:pPr lvl="1"/>
+            <a:r>
+              <a:rPr lang="en-US" dirty="0" smtClean="0"/>
+              <a:t>Target and opinion word extraction</a:t>
+            </a:r>
+          </a:p>
+          <a:p>
+            <a:pPr lvl="1"/>
+            <a:r>
+              <a:rPr lang="en-US" dirty="0" smtClean="0"/>
+              <a:t>Polarity assignment</a:t>
+            </a:r>
+          </a:p>
+          <a:p>
+            <a:r>
+              <a:rPr lang="en-US" dirty="0" smtClean="0"/>
+              <a:t>Results</a:t>
+            </a:r>
+          </a:p>
+          <a:p>
+            <a:r>
+              <a:rPr lang="en-US" dirty="0" smtClean="0"/>
+              <a:t>Improvements</a:t>
             </a:r>
           </a:p>
           <a:p>
@@ -6015,41 +5763,110 @@
           <a:p>
             <a:r>
               <a:rPr lang="en-US" dirty="0" smtClean="0"/>
-              <a:t>Step 2 – Extraction Rules</a:t>
+              <a:t>Step 3</a:t>
             </a:r>
             <a:endParaRPr lang="en-US" dirty="0"/>
           </a:p>
         </p:txBody>
       </p:sp>
-      <p:pic>
-        <p:nvPicPr>
-          <p:cNvPr id="5" name="Content Placeholder 4"/>
-          <p:cNvPicPr>
-            <a:picLocks noGrp="1" noChangeAspect="1"/>
-          </p:cNvPicPr>
+      <p:sp>
+        <p:nvSpPr>
+          <p:cNvPr id="3" name="Content Placeholder 2"/>
+          <p:cNvSpPr>
+            <a:spLocks noGrp="1"/>
+          </p:cNvSpPr>
           <p:nvPr>
             <p:ph idx="1"/>
           </p:nvPr>
-        </p:nvPicPr>
-        <p:blipFill>
-          <a:blip r:embed="rId2">
-            <a:extLst>
-              <a:ext uri="{28A0092B-C50C-407E-A947-70E740481C1C}">
-                <a14:useLocalDpi xmlns:a14="http://schemas.microsoft.com/office/drawing/2010/main" val="0"/>
-              </a:ext>
-            </a:extLst>
-          </a:blip>
-          <a:stretch>
-            <a:fillRect/>
-          </a:stretch>
-        </p:blipFill>
+        </p:nvSpPr>
         <p:spPr>
           <a:xfrm>
-            <a:off x="1625240" y="1600200"/>
-            <a:ext cx="5893520" cy="4525963"/>
+            <a:off x="457200" y="1600200"/>
+            <a:ext cx="8229600" cy="4525963"/>
           </a:xfrm>
         </p:spPr>
-      </p:pic>
+        <p:txBody>
+          <a:bodyPr/>
+          <a:lstStyle/>
+          <a:p>
+            <a:r>
+              <a:rPr lang="en-US" dirty="0" err="1" smtClean="0"/>
+              <a:t>Scoring is based on the guidelines proposed in </a:t>
+            </a:r>
+            <a:r>
+              <a:rPr lang="en-US" i="1" dirty="0" smtClean="0"/>
+              <a:t>“Opinion Word Expansion and Target Extraction through Double Propagation, 2011” </a:t>
+            </a:r>
+            <a:r>
+              <a:rPr lang="en-US" dirty="0" smtClean="0"/>
+              <a:t>by </a:t>
+            </a:r>
+            <a:r>
+              <a:rPr lang="en-US" i="1" dirty="0" smtClean="0"/>
+              <a:t>Bing Liu.</a:t>
+            </a:r>
+            <a:endParaRPr lang="en-US" dirty="0"/>
+          </a:p>
+          <a:p>
+            <a:pPr marL="0" indent="0">
+              <a:buNone/>
+            </a:pPr>
+            <a:r>
+              <a:rPr lang="en-US" i="0" dirty="0" smtClean="0"/>
+              <a:t>1. Heterogeneous rule: for targets extracted by known opinion words and vice versa, assign the score of the known word to ghe extracted word. For instance, if we know </a:t>
+            </a:r>
+            <a:r>
+              <a:rPr lang="en-US" i="1" dirty="0" smtClean="0"/>
+              <a:t>good</a:t>
+            </a:r>
+            <a:r>
+              <a:rPr lang="en-US" i="0" dirty="0" smtClean="0"/>
+              <a:t> </a:t>
+            </a:r>
+            <a:r>
+              <a:rPr lang="en-US" i="1" dirty="0" smtClean="0"/>
+              <a:t> </a:t>
+            </a:r>
+            <a:r>
+              <a:rPr lang="en-US" i="0" dirty="0" smtClean="0"/>
+              <a:t>which has score </a:t>
+            </a:r>
+            <a:r>
+              <a:rPr lang="en-US" i="1" dirty="0" smtClean="0"/>
+              <a:t>S</a:t>
+            </a:r>
+            <a:r>
+              <a:rPr lang="en-US" i="0" dirty="0" smtClean="0"/>
+              <a:t> and extract </a:t>
+            </a:r>
+            <a:r>
+              <a:rPr lang="en-US" i="1" dirty="0" smtClean="0"/>
+              <a:t>camera</a:t>
+            </a:r>
+            <a:r>
+              <a:rPr lang="en-US" i="0" dirty="0" smtClean="0"/>
+              <a:t>, then </a:t>
+            </a:r>
+            <a:r>
+              <a:rPr lang="en-US" i="1" dirty="0" smtClean="0"/>
+              <a:t>camera</a:t>
+            </a:r>
+            <a:r>
+              <a:rPr lang="en-US" i="0" dirty="0" smtClean="0"/>
+              <a:t> will have score </a:t>
+            </a:r>
+            <a:r>
+              <a:rPr lang="en-US" i="1" dirty="0" smtClean="0"/>
+              <a:t>S</a:t>
+            </a:r>
+            <a:r>
+              <a:rPr lang="en-US" i="0" dirty="0" smtClean="0"/>
+              <a:t>.</a:t>
+            </a:r>
+            <a:endParaRPr/>
+          </a:p>
+        </p:txBody>
+      </p:sp>
       <p:sp>
         <p:nvSpPr>
           <p:cNvPr id="4" name="Title 1"/>
@@ -6073,53 +5890,24 @@
           </a:bodyPr>
           <a:lstStyle/>
           <a:p>
-            <a:pPr marL="0" marR="0" lvl="0" indent="0" algn="r" defTabSz="914400" rtl="0" eaLnBrk="1" fontAlgn="auto" latinLnBrk="0" hangingPunct="1">
-              <a:lnSpc>
-                <a:spcPct val="100000"/>
-              </a:lnSpc>
+            <a:pPr lvl="0" algn="r">
               <a:spcBef>
                 <a:spcPct val="0"/>
               </a:spcBef>
-              <a:spcAft>
-                <a:spcPts val="0"/>
-              </a:spcAft>
-              <a:buClrTx/>
-              <a:buSzTx/>
-              <a:buFontTx/>
-              <a:buNone/>
-              <a:tabLst/>
               <a:defRPr/>
             </a:pPr>
             <a:r>
-              <a:rPr kumimoji="0" lang="en-US" sz="3000" b="0" i="0" u="none" strike="noStrike" kern="1200" cap="small" spc="0" normalizeH="0" baseline="0" noProof="0" dirty="0" smtClean="0">
-                <a:ln>
-                  <a:noFill/>
-                </a:ln>
+              <a:rPr lang="en-US" sz="3000" cap="small" dirty="0" smtClean="0">
                 <a:solidFill>
                   <a:schemeClr val="tx2"/>
                 </a:solidFill>
-                <a:effectLst/>
-                <a:uLnTx/>
-                <a:uFillTx/>
-                <a:latin typeface="+mj-lt"/>
-                <a:ea typeface="+mj-ea"/>
-                <a:cs typeface="+mj-cs"/>
               </a:rPr>
-              <a:t>Introduction</a:t>
-            </a:r>
-            <a:endParaRPr kumimoji="0" lang="en-US" sz="3000" b="0" i="0" u="none" strike="noStrike" kern="1200" cap="small" spc="0" normalizeH="0" baseline="0" noProof="0" dirty="0">
-              <a:ln>
-                <a:noFill/>
-              </a:ln>
+              <a:t>Polarity assignment</a:t>
+            </a:r>
+            <a:endParaRPr lang="en-US" sz="3000" cap="small" dirty="0">
               <a:solidFill>
                 <a:schemeClr val="tx2"/>
               </a:solidFill>
-              <a:effectLst/>
-              <a:uLnTx/>
-              <a:uFillTx/>
-              <a:latin typeface="+mj-lt"/>
-              <a:ea typeface="+mj-ea"/>
-              <a:cs typeface="+mj-cs"/>
             </a:endParaRPr>
           </a:p>
         </p:txBody>
@@ -6127,20 +5915,13 @@
     </p:spTree>
     <p:extLst>
       <p:ext uri="{BB962C8B-B14F-4D97-AF65-F5344CB8AC3E}">
-        <p14:creationId xmlns:p14="http://schemas.microsoft.com/office/powerpoint/2010/main" val="541022935"/>
+        <p14:creationId xmlns:p14="http://schemas.microsoft.com/office/powerpoint/2010/main" val="368298825"/>
       </p:ext>
     </p:extLst>
   </p:cSld>
   <p:clrMapOvr>
     <a:masterClrMapping/>
   </p:clrMapOvr>
-  <p:timing>
-    <p:tnLst>
-      <p:par>
-        <p:cTn id="1" dur="indefinite" restart="never" nodeType="tmRoot"/>
-      </p:par>
-    </p:tnLst>
-  </p:timing>
 </p:sld>
 </file>
 
@@ -6163,51 +5944,40 @@
       </p:grpSpPr>
       <p:sp>
         <p:nvSpPr>
-          <p:cNvPr id="2" name="Title 1"/>
-          <p:cNvSpPr>
-            <a:spLocks noGrp="1"/>
-          </p:cNvSpPr>
-          <p:nvPr>
-            <p:ph type="title"/>
-          </p:nvPr>
-        </p:nvSpPr>
-        <p:spPr/>
+          <p:cNvPr id="3" name="Content Placeholder 2"/>
+          <p:cNvSpPr>
+            <a:spLocks noGrp="1"/>
+          </p:cNvSpPr>
+          <p:nvPr>
+            <p:ph idx="1"/>
+          </p:nvPr>
+        </p:nvSpPr>
+        <p:spPr>
+          <a:xfrm>
+            <a:off x="457950" y="1143000"/>
+            <a:ext cx="8228850" cy="4983163"/>
+          </a:xfrm>
+        </p:spPr>
         <p:txBody>
           <a:bodyPr/>
           <a:lstStyle/>
           <a:p>
-            <a:r>
-              <a:rPr lang="en-US" dirty="0" smtClean="0"/>
-              <a:t>Step 3</a:t>
-            </a:r>
-            <a:endParaRPr lang="en-US" dirty="0"/>
-          </a:p>
-        </p:txBody>
-      </p:sp>
-      <p:sp>
-        <p:nvSpPr>
-          <p:cNvPr id="3" name="Content Placeholder 2"/>
-          <p:cNvSpPr>
-            <a:spLocks noGrp="1"/>
-          </p:cNvSpPr>
-          <p:nvPr>
-            <p:ph idx="1"/>
-          </p:nvPr>
-        </p:nvSpPr>
-        <p:spPr/>
-        <p:txBody>
-          <a:bodyPr/>
-          <a:lstStyle/>
-          <a:p>
-            <a:r>
-              <a:rPr lang="en-US" dirty="0" err="1" smtClean="0"/>
-              <a:t>Vlad</a:t>
-            </a:r>
-            <a:r>
-              <a:rPr lang="en-US" dirty="0" smtClean="0"/>
-              <a:t>..?</a:t>
-            </a:r>
-            <a:endParaRPr lang="en-US" dirty="0"/>
+            <a:pPr marL="0" lvl="0" indent="0">
+              <a:buNone/>
+            </a:pPr>
+            <a:r>
+              <a:rPr dirty="0"/>
+              <a:t>2. Homogeneous rule: For opinion words extracted by known opinion words and targets extracted by known targets, assign the same score as the known word.</a:t>
+            </a:r>
+          </a:p>
+          <a:p>
+            <a:pPr marL="0" lvl="0" indent="0">
+              <a:buNone/>
+            </a:pPr>
+            <a:r>
+              <a:rPr dirty="0"/>
+              <a:t>3. Intra-review rule: Polarities are transmitted only in the same review and not between reviews. For instance if we know the polarity of a word from a previous review and find the same word in the current review, we have to assign a new polarity to it. Likewise, same words in the same review have the same polarity.</a:t>
+            </a:r>
           </a:p>
         </p:txBody>
       </p:sp>
@@ -6234,53 +6004,24 @@
           </a:bodyPr>
           <a:lstStyle/>
           <a:p>
-            <a:pPr marL="0" marR="0" lvl="0" indent="0" algn="r" defTabSz="914400" rtl="0" eaLnBrk="1" fontAlgn="auto" latinLnBrk="0" hangingPunct="1">
-              <a:lnSpc>
-                <a:spcPct val="100000"/>
-              </a:lnSpc>
+            <a:pPr lvl="0" algn="r">
               <a:spcBef>
                 <a:spcPct val="0"/>
               </a:spcBef>
-              <a:spcAft>
-                <a:spcPts val="0"/>
-              </a:spcAft>
-              <a:buClrTx/>
-              <a:buSzTx/>
-              <a:buFontTx/>
-              <a:buNone/>
-              <a:tabLst/>
               <a:defRPr/>
             </a:pPr>
             <a:r>
-              <a:rPr kumimoji="0" lang="en-US" sz="3000" b="0" i="0" u="none" strike="noStrike" kern="1200" cap="small" spc="0" normalizeH="0" baseline="0" noProof="0" dirty="0" smtClean="0">
-                <a:ln>
-                  <a:noFill/>
-                </a:ln>
+              <a:rPr lang="en-US" sz="3000" cap="small" dirty="0" smtClean="0">
                 <a:solidFill>
                   <a:schemeClr val="tx2"/>
                 </a:solidFill>
-                <a:effectLst/>
-                <a:uLnTx/>
-                <a:uFillTx/>
-                <a:latin typeface="+mj-lt"/>
-                <a:ea typeface="+mj-ea"/>
-                <a:cs typeface="+mj-cs"/>
               </a:rPr>
-              <a:t>Introduction</a:t>
-            </a:r>
-            <a:endParaRPr kumimoji="0" lang="en-US" sz="3000" b="0" i="0" u="none" strike="noStrike" kern="1200" cap="small" spc="0" normalizeH="0" baseline="0" noProof="0" dirty="0">
-              <a:ln>
-                <a:noFill/>
-              </a:ln>
+              <a:t>Polarity assignment</a:t>
+            </a:r>
+            <a:endParaRPr lang="en-US" sz="3000" cap="small" dirty="0">
               <a:solidFill>
                 <a:schemeClr val="tx2"/>
               </a:solidFill>
-              <a:effectLst/>
-              <a:uLnTx/>
-              <a:uFillTx/>
-              <a:latin typeface="+mj-lt"/>
-              <a:ea typeface="+mj-ea"/>
-              <a:cs typeface="+mj-cs"/>
             </a:endParaRPr>
           </a:p>
         </p:txBody>
@@ -6288,7 +6029,7 @@
     </p:spTree>
     <p:extLst>
       <p:ext uri="{BB962C8B-B14F-4D97-AF65-F5344CB8AC3E}">
-        <p14:creationId xmlns:p14="http://schemas.microsoft.com/office/powerpoint/2010/main" val="786935628"/>
+        <p14:creationId xmlns:p14="http://schemas.microsoft.com/office/powerpoint/2010/main" val="1118382557"/>
       </p:ext>
     </p:extLst>
   </p:cSld>
@@ -6465,7 +6206,7 @@
                 <a:ea typeface="+mj-ea"/>
                 <a:cs typeface="+mj-cs"/>
               </a:rPr>
-              <a:t>Introduction</a:t>
+              <a:t>results</a:t>
             </a:r>
             <a:endParaRPr kumimoji="0" lang="en-US" sz="3000" b="0" i="0" u="none" strike="noStrike" kern="1200" cap="small" spc="0" normalizeH="0" baseline="0" noProof="0" dirty="0">
               <a:ln>
@@ -6629,7 +6370,7 @@
                 <a:ea typeface="+mj-ea"/>
                 <a:cs typeface="+mj-cs"/>
               </a:rPr>
-              <a:t>Introduction</a:t>
+              <a:t>results</a:t>
             </a:r>
             <a:endParaRPr kumimoji="0" lang="en-US" sz="3000" b="0" i="0" u="none" strike="noStrike" kern="1200" cap="small" spc="0" normalizeH="0" baseline="0" noProof="0" dirty="0">
               <a:ln>
@@ -6761,7 +6502,7 @@
       </p:sp>
       <p:sp>
         <p:nvSpPr>
-          <p:cNvPr id="4" name="Title 1"/>
+          <p:cNvPr id="5" name="Title 1"/>
           <p:cNvSpPr txBox="1">
             <a:spLocks/>
           </p:cNvSpPr>
@@ -6814,7 +6555,7 @@
                 <a:ea typeface="+mj-ea"/>
                 <a:cs typeface="+mj-cs"/>
               </a:rPr>
-              <a:t>Introduction</a:t>
+              <a:t>improvements</a:t>
             </a:r>
             <a:endParaRPr kumimoji="0" lang="en-US" sz="3000" b="0" i="0" u="none" strike="noStrike" kern="1200" cap="small" spc="0" normalizeH="0" baseline="0" noProof="0" dirty="0">
               <a:ln>
@@ -7051,7 +6792,7 @@
                 <a:ea typeface="+mj-ea"/>
                 <a:cs typeface="+mj-cs"/>
               </a:rPr>
-              <a:t>Introduction</a:t>
+              <a:t>improvements</a:t>
             </a:r>
             <a:endParaRPr kumimoji="0" lang="en-US" sz="3000" b="0" i="0" u="none" strike="noStrike" kern="1200" cap="small" spc="0" normalizeH="0" baseline="0" noProof="0" dirty="0">
               <a:ln>
@@ -7133,38 +6874,32 @@
             <p:ph idx="1"/>
           </p:nvPr>
         </p:nvSpPr>
-        <p:spPr/>
+        <p:spPr>
+          <a:xfrm>
+            <a:off x="457950" y="1600128"/>
+            <a:ext cx="8228850" cy="4526035"/>
+          </a:xfrm>
+        </p:spPr>
         <p:txBody>
           <a:bodyPr/>
           <a:lstStyle/>
           <a:p>
             <a:r>
-              <a:rPr lang="en-US" dirty="0" err="1" smtClean="0"/>
-              <a:t>Vlad</a:t>
-            </a:r>
-            <a:r>
-              <a:rPr lang="en-US" dirty="0" smtClean="0"/>
-              <a:t>..? :D</a:t>
-            </a:r>
-          </a:p>
-          <a:p>
-            <a:endParaRPr lang="en-US" dirty="0"/>
-          </a:p>
-          <a:p>
-            <a:endParaRPr lang="en-US" dirty="0" smtClean="0"/>
-          </a:p>
-          <a:p>
-            <a:pPr marL="342900" lvl="1" indent="-342900">
-              <a:buFont typeface="Arial" pitchFamily="34" charset="0"/>
-              <a:buChar char="•"/>
-            </a:pPr>
+              <a:rPr lang="en-US" dirty="0" smtClean="0"/>
+              <a:t>Try </a:t>
+            </a:r>
+            <a:r>
+              <a:rPr lang="en-US" dirty="0" smtClean="0"/>
+              <a:t>other sentiment scoring sources and algorithms</a:t>
+            </a:r>
+            <a:endParaRPr dirty="0"/>
+          </a:p>
+          <a:p>
             <a:r>
               <a:rPr lang="en-US" dirty="0"/>
               <a:t>Add Opinion Word modifiers</a:t>
             </a:r>
-          </a:p>
-          <a:p>
-            <a:endParaRPr lang="en-US" dirty="0"/>
+            <a:endParaRPr dirty="0"/>
           </a:p>
         </p:txBody>
       </p:sp>
@@ -7223,7 +6958,7 @@
                 <a:ea typeface="+mj-ea"/>
                 <a:cs typeface="+mj-cs"/>
               </a:rPr>
-              <a:t>Introduction</a:t>
+              <a:t>improvements</a:t>
             </a:r>
             <a:endParaRPr kumimoji="0" lang="en-US" sz="3000" b="0" i="0" u="none" strike="noStrike" kern="1200" cap="small" spc="0" normalizeH="0" baseline="0" noProof="0" dirty="0">
               <a:ln>
@@ -7245,7 +6980,7 @@
     </p:spTree>
     <p:extLst>
       <p:ext uri="{BB962C8B-B14F-4D97-AF65-F5344CB8AC3E}">
-        <p14:creationId xmlns:p14="http://schemas.microsoft.com/office/powerpoint/2010/main" val="975363073"/>
+        <p14:creationId xmlns:p14="http://schemas.microsoft.com/office/powerpoint/2010/main" val="4137034783"/>
       </p:ext>
     </p:extLst>
   </p:cSld>
@@ -8012,7 +7747,7 @@
         <p:spPr>
           <a:xfrm>
             <a:off x="4400550" y="1295400"/>
-            <a:ext cx="4591050" cy="369332"/>
+            <a:ext cx="4591050" cy="3139321"/>
           </a:xfrm>
           <a:prstGeom prst="rect">
             <a:avLst/>
@@ -8027,8 +7762,63 @@
           <a:p>
             <a:r>
               <a:rPr lang="en-US" dirty="0" smtClean="0"/>
-              <a:t>Introduction text</a:t>
-            </a:r>
+              <a:t>People express opinions regarding just about everything, whether they are </a:t>
+            </a:r>
+          </a:p>
+          <a:p>
+            <a:pPr marL="285750" indent="-285750">
+              <a:buFont typeface="Wingdings" panose="05000000000000000000" pitchFamily="2" charset="2"/>
+              <a:buChar char="Ø"/>
+            </a:pPr>
+            <a:r>
+              <a:rPr lang="en-US" dirty="0" smtClean="0"/>
+              <a:t>product-related </a:t>
+            </a:r>
+            <a:endParaRPr lang="en-US" dirty="0"/>
+          </a:p>
+          <a:p>
+            <a:pPr marL="285750" indent="-285750">
+              <a:buFont typeface="Wingdings" panose="05000000000000000000" pitchFamily="2" charset="2"/>
+              <a:buChar char="Ø"/>
+            </a:pPr>
+            <a:r>
+              <a:rPr lang="en-US" dirty="0" smtClean="0"/>
+              <a:t>touristic attractions-related</a:t>
+            </a:r>
+          </a:p>
+          <a:p>
+            <a:pPr marL="285750" indent="-285750">
+              <a:buFont typeface="Wingdings" panose="05000000000000000000" pitchFamily="2" charset="2"/>
+              <a:buChar char="Ø"/>
+            </a:pPr>
+            <a:r>
+              <a:rPr lang="en-US" dirty="0" smtClean="0"/>
+              <a:t>…</a:t>
+            </a:r>
+          </a:p>
+          <a:p>
+            <a:pPr marL="285750" indent="-285750">
+              <a:buFont typeface="Wingdings" panose="05000000000000000000" pitchFamily="2" charset="2"/>
+              <a:buChar char="Ø"/>
+            </a:pPr>
+            <a:r>
+              <a:rPr lang="en-US" dirty="0" smtClean="0"/>
+              <a:t>UFO sightings</a:t>
+            </a:r>
+          </a:p>
+          <a:p>
+            <a:endParaRPr lang="en-US" dirty="0" smtClean="0"/>
+          </a:p>
+          <a:p>
+            <a:endParaRPr lang="en-US" dirty="0"/>
+          </a:p>
+          <a:p>
+            <a:r>
+              <a:rPr lang="en-US" dirty="0" smtClean="0"/>
+              <a:t>The easiest way to express opinions is to use dedicated websites</a:t>
+            </a:r>
+          </a:p>
+          <a:p>
             <a:endParaRPr lang="en-US" dirty="0"/>
           </a:p>
         </p:txBody>
@@ -8065,18 +7855,18 @@
       </p:grpSpPr>
       <p:sp>
         <p:nvSpPr>
-          <p:cNvPr id="2" name="Title 1"/>
-          <p:cNvSpPr>
-            <a:spLocks noGrp="1"/>
-          </p:cNvSpPr>
-          <p:nvPr>
-            <p:ph type="title"/>
+          <p:cNvPr id="3" name="Content Placeholder 2"/>
+          <p:cNvSpPr>
+            <a:spLocks noGrp="1"/>
+          </p:cNvSpPr>
+          <p:nvPr>
+            <p:ph idx="1"/>
           </p:nvPr>
         </p:nvSpPr>
         <p:spPr>
           <a:xfrm>
-            <a:off x="457200" y="1066800"/>
-            <a:ext cx="7886700" cy="1325563"/>
+            <a:off x="628650" y="838200"/>
+            <a:ext cx="7886700" cy="5338763"/>
           </a:xfrm>
         </p:spPr>
         <p:txBody>
@@ -8084,92 +7874,42 @@
           <a:lstStyle/>
           <a:p>
             <a:r>
-              <a:rPr lang="ro-RO" dirty="0" smtClean="0"/>
-              <a:t>Definitions and terms</a:t>
-            </a:r>
-            <a:endParaRPr lang="en-US" dirty="0"/>
-          </a:p>
-        </p:txBody>
-      </p:sp>
-      <p:sp>
-        <p:nvSpPr>
-          <p:cNvPr id="3" name="Content Placeholder 2"/>
-          <p:cNvSpPr>
-            <a:spLocks noGrp="1"/>
-          </p:cNvSpPr>
-          <p:nvPr>
-            <p:ph idx="1"/>
-          </p:nvPr>
-        </p:nvSpPr>
-        <p:spPr>
-          <a:xfrm>
-            <a:off x="457200" y="2506662"/>
-            <a:ext cx="7886700" cy="4351338"/>
-          </a:xfrm>
-        </p:spPr>
-        <p:txBody>
-          <a:bodyPr>
-            <a:normAutofit/>
-          </a:bodyPr>
-          <a:lstStyle/>
-          <a:p>
-            <a:r>
-              <a:rPr lang="ro-RO" b="1" i="1" dirty="0" smtClean="0"/>
-              <a:t>Sentiment analysis</a:t>
-            </a:r>
-            <a:r>
-              <a:rPr lang="en-US" dirty="0" smtClean="0"/>
-              <a:t>: using NLP to identify and extract subjective information</a:t>
-            </a:r>
-          </a:p>
-          <a:p>
-            <a:r>
-              <a:rPr lang="en-US" b="1" i="1" dirty="0" smtClean="0"/>
-              <a:t>Corpus</a:t>
-            </a:r>
-            <a:r>
-              <a:rPr lang="en-US" dirty="0" smtClean="0"/>
-              <a:t>: large and unstructured set of texts</a:t>
-            </a:r>
-          </a:p>
-          <a:p>
-            <a:r>
-              <a:rPr lang="en-US" b="1" i="1" dirty="0" smtClean="0"/>
-              <a:t>Supervised</a:t>
-            </a:r>
-            <a:r>
-              <a:rPr lang="en-US" dirty="0" smtClean="0"/>
-              <a:t>: using machine learning to train classifiers – </a:t>
-            </a:r>
-            <a:r>
-              <a:rPr lang="en-US" b="1" i="1" dirty="0" smtClean="0"/>
-              <a:t>domain dependent!</a:t>
-            </a:r>
-          </a:p>
-          <a:p>
-            <a:r>
-              <a:rPr lang="en-US" b="1" i="1" dirty="0" smtClean="0"/>
-              <a:t>Unsupervised</a:t>
-            </a:r>
-            <a:r>
-              <a:rPr lang="en-US" dirty="0" smtClean="0"/>
-              <a:t>: (in this case) domain independent and without the use of supervised learning techniques</a:t>
-            </a:r>
-          </a:p>
-          <a:p>
-            <a:r>
-              <a:rPr lang="en-US" b="1" i="1" dirty="0" smtClean="0"/>
-              <a:t>POS:</a:t>
-            </a:r>
-            <a:r>
-              <a:rPr lang="en-US" dirty="0" smtClean="0"/>
-              <a:t> part of speech</a:t>
-            </a:r>
-          </a:p>
-          <a:p>
-            <a:endParaRPr lang="en-US" b="1" i="1" dirty="0" smtClean="0"/>
-          </a:p>
-          <a:p>
+              <a:rPr lang="en-US" dirty="0" smtClean="0"/>
+              <a:t>Tons of information</a:t>
+            </a:r>
+          </a:p>
+          <a:p>
+            <a:r>
+              <a:rPr lang="en-US" dirty="0" smtClean="0"/>
+              <a:t>Increasing budgets and attention towards gathering information regarding certain subjects</a:t>
+            </a:r>
+          </a:p>
+          <a:p>
+            <a:r>
+              <a:rPr lang="en-US" dirty="0" smtClean="0"/>
+              <a:t>Why unsupervised? </a:t>
+            </a:r>
+          </a:p>
+          <a:p>
+            <a:pPr lvl="1"/>
+            <a:r>
+              <a:rPr lang="en-US" dirty="0" smtClean="0"/>
+              <a:t>Easier to use – no more manual annotations!</a:t>
+            </a:r>
+          </a:p>
+          <a:p>
+            <a:pPr lvl="1"/>
+            <a:r>
+              <a:rPr lang="en-US" dirty="0" smtClean="0"/>
+              <a:t>Faster</a:t>
+            </a:r>
+          </a:p>
+          <a:p>
+            <a:pPr lvl="1"/>
+            <a:r>
+              <a:rPr lang="en-US" dirty="0" smtClean="0"/>
+              <a:t>Cross-domain</a:t>
+            </a:r>
             <a:endParaRPr lang="en-US" dirty="0"/>
           </a:p>
         </p:txBody>
@@ -8229,7 +7969,7 @@
                 <a:ea typeface="+mj-ea"/>
                 <a:cs typeface="+mj-cs"/>
               </a:rPr>
-              <a:t>Introduction</a:t>
+              <a:t>Motivation</a:t>
             </a:r>
             <a:endParaRPr kumimoji="0" lang="en-US" sz="3000" b="0" i="0" u="none" strike="noStrike" kern="1200" cap="small" spc="0" normalizeH="0" baseline="0" noProof="0" dirty="0">
               <a:ln>
@@ -8251,20 +7991,13 @@
     </p:spTree>
     <p:extLst>
       <p:ext uri="{BB962C8B-B14F-4D97-AF65-F5344CB8AC3E}">
-        <p14:creationId xmlns:p14="http://schemas.microsoft.com/office/powerpoint/2010/main" val="3526228361"/>
+        <p14:creationId xmlns:p14="http://schemas.microsoft.com/office/powerpoint/2010/main" val="3307423392"/>
       </p:ext>
     </p:extLst>
   </p:cSld>
   <p:clrMapOvr>
     <a:masterClrMapping/>
   </p:clrMapOvr>
-  <p:timing>
-    <p:tnLst>
-      <p:par>
-        <p:cTn id="1" dur="indefinite" restart="never" nodeType="tmRoot"/>
-      </p:par>
-    </p:tnLst>
-  </p:timing>
 </p:sld>
 </file>
 
@@ -8287,92 +8020,54 @@
       </p:grpSpPr>
       <p:sp>
         <p:nvSpPr>
-          <p:cNvPr id="2" name="Title 1"/>
-          <p:cNvSpPr>
-            <a:spLocks noGrp="1"/>
-          </p:cNvSpPr>
-          <p:nvPr>
-            <p:ph type="title"/>
-          </p:nvPr>
-        </p:nvSpPr>
-        <p:spPr/>
+          <p:cNvPr id="3" name="Content Placeholder 2"/>
+          <p:cNvSpPr>
+            <a:spLocks noGrp="1"/>
+          </p:cNvSpPr>
+          <p:nvPr>
+            <p:ph idx="1"/>
+          </p:nvPr>
+        </p:nvSpPr>
+        <p:spPr>
+          <a:xfrm>
+            <a:off x="628650" y="2209800"/>
+            <a:ext cx="7886700" cy="3967163"/>
+          </a:xfrm>
+        </p:spPr>
         <p:txBody>
           <a:bodyPr/>
           <a:lstStyle/>
           <a:p>
             <a:r>
               <a:rPr lang="en-US" dirty="0" smtClean="0"/>
-              <a:t>Approach nr. 1 – GATE (Supervised)</a:t>
-            </a:r>
-            <a:endParaRPr lang="en-US" dirty="0"/>
-          </a:p>
-        </p:txBody>
-      </p:sp>
-      <p:sp>
-        <p:nvSpPr>
-          <p:cNvPr id="3" name="Content Placeholder 2"/>
-          <p:cNvSpPr>
-            <a:spLocks noGrp="1"/>
-          </p:cNvSpPr>
-          <p:nvPr>
-            <p:ph idx="1"/>
-          </p:nvPr>
-        </p:nvSpPr>
-        <p:spPr/>
-        <p:txBody>
-          <a:bodyPr/>
-          <a:lstStyle/>
-          <a:p>
-            <a:r>
-              <a:rPr lang="en-US" b="1" i="1" dirty="0" smtClean="0"/>
-              <a:t>GATE</a:t>
-            </a:r>
-            <a:r>
-              <a:rPr lang="en-US" dirty="0" smtClean="0"/>
-              <a:t>:</a:t>
-            </a:r>
-            <a:r>
-              <a:rPr lang="en-US" b="1" i="1" dirty="0" smtClean="0"/>
-              <a:t> </a:t>
-            </a:r>
-            <a:r>
-              <a:rPr lang="en-US" b="1" dirty="0"/>
-              <a:t>G</a:t>
-            </a:r>
-            <a:r>
-              <a:rPr lang="en-US" dirty="0" smtClean="0"/>
-              <a:t>eneral </a:t>
-            </a:r>
-            <a:r>
-              <a:rPr lang="en-US" b="1" dirty="0" smtClean="0"/>
-              <a:t>A</a:t>
-            </a:r>
-            <a:r>
-              <a:rPr lang="en-US" dirty="0" smtClean="0"/>
-              <a:t>rchitecture for </a:t>
-            </a:r>
-            <a:r>
-              <a:rPr lang="en-US" b="1" dirty="0" smtClean="0"/>
-              <a:t>T</a:t>
-            </a:r>
-            <a:r>
-              <a:rPr lang="en-US" dirty="0" smtClean="0"/>
-              <a:t>ext </a:t>
-            </a:r>
-            <a:r>
-              <a:rPr lang="en-US" b="1" dirty="0" smtClean="0"/>
-              <a:t>E</a:t>
-            </a:r>
-            <a:r>
-              <a:rPr lang="en-US" dirty="0" smtClean="0"/>
-              <a:t>ngineering</a:t>
+              <a:t>Based on the Double propagation algorithm</a:t>
+            </a:r>
+          </a:p>
+          <a:p>
+            <a:r>
+              <a:rPr lang="en-US" dirty="0" smtClean="0"/>
+              <a:t>Three main steps: </a:t>
             </a:r>
           </a:p>
           <a:p>
             <a:pPr lvl="1"/>
             <a:r>
               <a:rPr lang="en-US" dirty="0" smtClean="0"/>
-              <a:t>Java based open source framework </a:t>
+              <a:t>Pre-processing</a:t>
+            </a:r>
+          </a:p>
+          <a:p>
+            <a:pPr lvl="1"/>
+            <a:r>
+              <a:rPr lang="en-US" dirty="0" smtClean="0"/>
+              <a:t>Target and opinion words extraction</a:t>
+            </a:r>
+          </a:p>
+          <a:p>
+            <a:pPr lvl="1"/>
+            <a:r>
+              <a:rPr lang="en-US" dirty="0" smtClean="0"/>
+              <a:t>Polarity assignment</a:t>
             </a:r>
             <a:endParaRPr lang="en-US" dirty="0"/>
           </a:p>
@@ -8419,21 +8114,15 @@
               <a:defRPr/>
             </a:pPr>
             <a:r>
-              <a:rPr kumimoji="0" lang="en-US" sz="3000" b="0" i="0" u="none" strike="noStrike" kern="1200" cap="small" spc="0" normalizeH="0" baseline="0" noProof="0" dirty="0" smtClean="0">
-                <a:ln>
-                  <a:noFill/>
-                </a:ln>
+              <a:rPr lang="en-US" sz="3000" cap="small" dirty="0" smtClean="0">
                 <a:solidFill>
                   <a:schemeClr val="tx2"/>
                 </a:solidFill>
-                <a:effectLst/>
-                <a:uLnTx/>
-                <a:uFillTx/>
                 <a:latin typeface="+mj-lt"/>
                 <a:ea typeface="+mj-ea"/>
                 <a:cs typeface="+mj-cs"/>
               </a:rPr>
-              <a:t>Introduction</a:t>
+              <a:t>The proposed solution</a:t>
             </a:r>
             <a:endParaRPr kumimoji="0" lang="en-US" sz="3000" b="0" i="0" u="none" strike="noStrike" kern="1200" cap="small" spc="0" normalizeH="0" baseline="0" noProof="0" dirty="0">
               <a:ln>
@@ -8455,20 +8144,13 @@
     </p:spTree>
     <p:extLst>
       <p:ext uri="{BB962C8B-B14F-4D97-AF65-F5344CB8AC3E}">
-        <p14:creationId xmlns:p14="http://schemas.microsoft.com/office/powerpoint/2010/main" val="3530545895"/>
+        <p14:creationId xmlns:p14="http://schemas.microsoft.com/office/powerpoint/2010/main" val="4266953192"/>
       </p:ext>
     </p:extLst>
   </p:cSld>
   <p:clrMapOvr>
     <a:masterClrMapping/>
   </p:clrMapOvr>
-  <p:timing>
-    <p:tnLst>
-      <p:par>
-        <p:cTn id="1" dur="indefinite" restart="never" nodeType="tmRoot"/>
-      </p:par>
-    </p:tnLst>
-  </p:timing>
 </p:sld>
 </file>
 
@@ -8506,86 +8188,44 @@
           <a:p>
             <a:r>
               <a:rPr lang="en-US" dirty="0" smtClean="0"/>
-              <a:t>Gate Pipeline used</a:t>
+              <a:t>General Architecture Overview</a:t>
             </a:r>
             <a:endParaRPr lang="en-US" dirty="0"/>
           </a:p>
         </p:txBody>
       </p:sp>
-      <p:sp>
-        <p:nvSpPr>
-          <p:cNvPr id="3" name="Content Placeholder 2"/>
-          <p:cNvSpPr>
-            <a:spLocks noGrp="1"/>
-          </p:cNvSpPr>
+      <p:pic>
+        <p:nvPicPr>
+          <p:cNvPr id="4" name="Content Placeholder 3"/>
+          <p:cNvPicPr>
+            <a:picLocks noGrp="1" noChangeAspect="1"/>
+          </p:cNvPicPr>
           <p:nvPr>
             <p:ph idx="1"/>
           </p:nvPr>
-        </p:nvSpPr>
-        <p:spPr/>
-        <p:txBody>
-          <a:bodyPr/>
-          <a:lstStyle/>
-          <a:p>
-            <a:r>
-              <a:rPr lang="en-US" dirty="0" smtClean="0"/>
-              <a:t>Document Reset PR</a:t>
-            </a:r>
-          </a:p>
-          <a:p>
-            <a:r>
-              <a:rPr lang="en-US" dirty="0" smtClean="0"/>
-              <a:t>Annotation Set Transfer</a:t>
-            </a:r>
-          </a:p>
-          <a:p>
-            <a:r>
-              <a:rPr lang="en-US" dirty="0" smtClean="0"/>
-              <a:t>ANNIE English </a:t>
-            </a:r>
-            <a:r>
-              <a:rPr lang="en-US" dirty="0" err="1" smtClean="0"/>
-              <a:t>Tokeniser</a:t>
-            </a:r>
-            <a:endParaRPr lang="en-US" dirty="0" smtClean="0"/>
-          </a:p>
-          <a:p>
-            <a:r>
-              <a:rPr lang="en-US" dirty="0" smtClean="0"/>
-              <a:t>ANNIE Sentence Splitter</a:t>
-            </a:r>
-          </a:p>
-          <a:p>
-            <a:r>
-              <a:rPr lang="en-US" dirty="0" smtClean="0"/>
-              <a:t>ANNIE POS Tagger</a:t>
-            </a:r>
-          </a:p>
-          <a:p>
-            <a:r>
-              <a:rPr lang="en-US" dirty="0" smtClean="0"/>
-              <a:t>GATE Morphological </a:t>
-            </a:r>
-            <a:r>
-              <a:rPr lang="en-US" dirty="0" err="1" smtClean="0"/>
-              <a:t>Analyser</a:t>
-            </a:r>
-            <a:endParaRPr lang="en-US" dirty="0" smtClean="0"/>
-          </a:p>
-          <a:p>
-            <a:r>
-              <a:rPr lang="en-US" dirty="0" smtClean="0"/>
-              <a:t>Batch Learning PR</a:t>
-            </a:r>
-          </a:p>
-          <a:p>
-            <a:endParaRPr lang="en-US" dirty="0"/>
-          </a:p>
-        </p:txBody>
-      </p:sp>
-      <p:sp>
-        <p:nvSpPr>
-          <p:cNvPr id="4" name="Title 1"/>
+        </p:nvPicPr>
+        <p:blipFill>
+          <a:blip r:embed="rId2">
+            <a:extLst>
+              <a:ext uri="{28A0092B-C50C-407E-A947-70E740481C1C}">
+                <a14:useLocalDpi xmlns:a14="http://schemas.microsoft.com/office/drawing/2010/main" val="0"/>
+              </a:ext>
+            </a:extLst>
+          </a:blip>
+          <a:stretch>
+            <a:fillRect/>
+          </a:stretch>
+        </p:blipFill>
+        <p:spPr>
+          <a:xfrm>
+            <a:off x="457200" y="2424181"/>
+            <a:ext cx="8229600" cy="2878001"/>
+          </a:xfrm>
+        </p:spPr>
+      </p:pic>
+      <p:sp>
+        <p:nvSpPr>
+          <p:cNvPr id="5" name="Title 1"/>
           <p:cNvSpPr txBox="1">
             <a:spLocks/>
           </p:cNvSpPr>
@@ -8638,7 +8278,7 @@
                 <a:ea typeface="+mj-ea"/>
                 <a:cs typeface="+mj-cs"/>
               </a:rPr>
-              <a:t>Introduction</a:t>
+              <a:t>The proposed solution</a:t>
             </a:r>
             <a:endParaRPr kumimoji="0" lang="en-US" sz="3000" b="0" i="0" u="none" strike="noStrike" kern="1200" cap="small" spc="0" normalizeH="0" baseline="0" noProof="0" dirty="0">
               <a:ln>
@@ -8660,13 +8300,20 @@
     </p:spTree>
     <p:extLst>
       <p:ext uri="{BB962C8B-B14F-4D97-AF65-F5344CB8AC3E}">
-        <p14:creationId xmlns:p14="http://schemas.microsoft.com/office/powerpoint/2010/main" val="1998842689"/>
+        <p14:creationId xmlns:p14="http://schemas.microsoft.com/office/powerpoint/2010/main" val="1960539458"/>
       </p:ext>
     </p:extLst>
   </p:cSld>
   <p:clrMapOvr>
     <a:masterClrMapping/>
   </p:clrMapOvr>
+  <p:timing>
+    <p:tnLst>
+      <p:par>
+        <p:cTn id="1" dur="indefinite" restart="never" nodeType="tmRoot"/>
+      </p:par>
+    </p:tnLst>
+  </p:timing>
 </p:sld>
 </file>
 
@@ -8699,14 +8346,12 @@
         </p:nvSpPr>
         <p:spPr/>
         <p:txBody>
-          <a:bodyPr>
-            <a:normAutofit/>
-          </a:bodyPr>
-          <a:lstStyle/>
-          <a:p>
-            <a:r>
-              <a:rPr lang="en-US" dirty="0" smtClean="0"/>
-              <a:t>Approach nr. 2 – Double Propagation based sentiment extraction (Unsupervised)</a:t>
+          <a:bodyPr/>
+          <a:lstStyle/>
+          <a:p>
+            <a:r>
+              <a:rPr lang="en-US" dirty="0" smtClean="0"/>
+              <a:t>Step 1</a:t>
             </a:r>
             <a:endParaRPr lang="en-US" dirty="0"/>
           </a:p>
@@ -8729,43 +8374,38 @@
           <a:p>
             <a:r>
               <a:rPr lang="en-US" dirty="0" smtClean="0"/>
-              <a:t>Based on </a:t>
-            </a:r>
-            <a:r>
-              <a:rPr lang="en-US" i="1" dirty="0" smtClean="0"/>
-              <a:t>“Opinion Word Expansion and Target Extraction through Double Propagation, 2011” </a:t>
-            </a:r>
-            <a:r>
-              <a:rPr lang="en-US" dirty="0" smtClean="0"/>
-              <a:t>by </a:t>
-            </a:r>
-            <a:r>
-              <a:rPr lang="en-US" i="1" dirty="0" smtClean="0"/>
-              <a:t>Bing Liu.</a:t>
-            </a:r>
-          </a:p>
-          <a:p>
-            <a:r>
-              <a:rPr lang="en-US" dirty="0" smtClean="0"/>
-              <a:t>Using </a:t>
-            </a:r>
-            <a:r>
-              <a:rPr lang="en-US" b="1" i="1" dirty="0" smtClean="0"/>
-              <a:t>seed words</a:t>
-            </a:r>
-          </a:p>
-          <a:p>
-            <a:r>
-              <a:rPr lang="en-US" dirty="0" smtClean="0"/>
-              <a:t>Domain independence given by those seed words</a:t>
-            </a:r>
-          </a:p>
-          <a:p>
-            <a:r>
-              <a:rPr lang="en-US" dirty="0" smtClean="0"/>
-              <a:t>No learning involved</a:t>
+              <a:t>Input format: any text files containing sentences</a:t>
+            </a:r>
+          </a:p>
+          <a:p>
+            <a:r>
+              <a:rPr lang="en-US" dirty="0" smtClean="0"/>
+              <a:t>Output format: Semantic Graphs</a:t>
             </a:r>
             <a:endParaRPr lang="en-US" dirty="0"/>
+          </a:p>
+          <a:p>
+            <a:r>
+              <a:rPr lang="en-US" dirty="0" smtClean="0"/>
+              <a:t>Semantic Graph Generation = MOST TIME CONSUMING PROCESS</a:t>
+            </a:r>
+          </a:p>
+          <a:p>
+            <a:pPr lvl="1"/>
+            <a:r>
+              <a:rPr lang="en-US" dirty="0" smtClean="0"/>
+              <a:t>Ex: 2000 line text file = 10&lt; minutes to generate SGs</a:t>
+            </a:r>
+          </a:p>
+          <a:p>
+            <a:pPr lvl="1"/>
+            <a:r>
+              <a:rPr lang="en-US" dirty="0" smtClean="0">
+                <a:sym typeface="Wingdings" pitchFamily="2" charset="2"/>
+              </a:rPr>
+              <a:t> The need to cache results for future use</a:t>
+            </a:r>
+            <a:endParaRPr lang="en-US" dirty="0" smtClean="0"/>
           </a:p>
         </p:txBody>
       </p:sp>
@@ -8824,7 +8464,7 @@
                 <a:ea typeface="+mj-ea"/>
                 <a:cs typeface="+mj-cs"/>
               </a:rPr>
-              <a:t>Introduction</a:t>
+              <a:t>Pre-processing</a:t>
             </a:r>
             <a:endParaRPr kumimoji="0" lang="en-US" sz="3000" b="0" i="0" u="none" strike="noStrike" kern="1200" cap="small" spc="0" normalizeH="0" baseline="0" noProof="0" dirty="0">
               <a:ln>
@@ -8846,20 +8486,13 @@
     </p:spTree>
     <p:extLst>
       <p:ext uri="{BB962C8B-B14F-4D97-AF65-F5344CB8AC3E}">
-        <p14:creationId xmlns:p14="http://schemas.microsoft.com/office/powerpoint/2010/main" val="1933639313"/>
+        <p14:creationId xmlns:p14="http://schemas.microsoft.com/office/powerpoint/2010/main" val="1408269909"/>
       </p:ext>
     </p:extLst>
   </p:cSld>
   <p:clrMapOvr>
     <a:masterClrMapping/>
   </p:clrMapOvr>
-  <p:timing>
-    <p:tnLst>
-      <p:par>
-        <p:cTn id="1" dur="indefinite" restart="never" nodeType="tmRoot"/>
-      </p:par>
-    </p:tnLst>
-  </p:timing>
 </p:sld>
 </file>
 

</xml_diff>